<commit_message>
added more content to design.pptx
</commit_message>
<xml_diff>
--- a/May23OCC/mywork/task1/design.pptx
+++ b/May23OCC/mywork/task1/design.pptx
@@ -12,10 +12,11 @@
     <p:sldId id="260" r:id="rId6"/>
     <p:sldId id="261" r:id="rId7"/>
     <p:sldId id="262" r:id="rId8"/>
-    <p:sldId id="263" r:id="rId9"/>
-    <p:sldId id="264" r:id="rId10"/>
-    <p:sldId id="265" r:id="rId11"/>
-    <p:sldId id="266" r:id="rId12"/>
+    <p:sldId id="267" r:id="rId9"/>
+    <p:sldId id="263" r:id="rId10"/>
+    <p:sldId id="264" r:id="rId11"/>
+    <p:sldId id="265" r:id="rId12"/>
+    <p:sldId id="266" r:id="rId13"/>
   </p:sldIdLst>
   <p:sldSz cx="12192000" cy="6858000"/>
   <p:notesSz cx="6858000" cy="9144000"/>
@@ -122,6 +123,2744 @@
 </p:presentation>
 </file>
 
+<file path=ppt/diagrams/colors1.xml><?xml version="1.0" encoding="utf-8"?>
+<dgm:colorsDef xmlns:dgm="http://schemas.openxmlformats.org/drawingml/2006/diagram" xmlns:a="http://schemas.openxmlformats.org/drawingml/2006/main" uniqueId="urn:microsoft.com/office/officeart/2005/8/colors/accent1_2">
+  <dgm:title val=""/>
+  <dgm:desc val=""/>
+  <dgm:catLst>
+    <dgm:cat type="accent1" pri="11200"/>
+  </dgm:catLst>
+  <dgm:styleLbl name="node0">
+    <dgm:fillClrLst meth="repeat">
+      <a:schemeClr val="accent1"/>
+    </dgm:fillClrLst>
+    <dgm:linClrLst meth="repeat">
+      <a:schemeClr val="lt1"/>
+    </dgm:linClrLst>
+    <dgm:effectClrLst/>
+    <dgm:txLinClrLst/>
+    <dgm:txFillClrLst/>
+    <dgm:txEffectClrLst/>
+  </dgm:styleLbl>
+  <dgm:styleLbl name="alignNode1">
+    <dgm:fillClrLst meth="repeat">
+      <a:schemeClr val="accent1"/>
+    </dgm:fillClrLst>
+    <dgm:linClrLst meth="repeat">
+      <a:schemeClr val="accent1"/>
+    </dgm:linClrLst>
+    <dgm:effectClrLst/>
+    <dgm:txLinClrLst/>
+    <dgm:txFillClrLst/>
+    <dgm:txEffectClrLst/>
+  </dgm:styleLbl>
+  <dgm:styleLbl name="node1">
+    <dgm:fillClrLst meth="repeat">
+      <a:schemeClr val="accent1"/>
+    </dgm:fillClrLst>
+    <dgm:linClrLst meth="repeat">
+      <a:schemeClr val="lt1"/>
+    </dgm:linClrLst>
+    <dgm:effectClrLst/>
+    <dgm:txLinClrLst/>
+    <dgm:txFillClrLst/>
+    <dgm:txEffectClrLst/>
+  </dgm:styleLbl>
+  <dgm:styleLbl name="lnNode1">
+    <dgm:fillClrLst meth="repeat">
+      <a:schemeClr val="accent1"/>
+    </dgm:fillClrLst>
+    <dgm:linClrLst meth="repeat">
+      <a:schemeClr val="lt1"/>
+    </dgm:linClrLst>
+    <dgm:effectClrLst/>
+    <dgm:txLinClrLst/>
+    <dgm:txFillClrLst/>
+    <dgm:txEffectClrLst/>
+  </dgm:styleLbl>
+  <dgm:styleLbl name="vennNode1">
+    <dgm:fillClrLst meth="repeat">
+      <a:schemeClr val="accent1">
+        <a:alpha val="50000"/>
+      </a:schemeClr>
+    </dgm:fillClrLst>
+    <dgm:linClrLst meth="repeat">
+      <a:schemeClr val="lt1"/>
+    </dgm:linClrLst>
+    <dgm:effectClrLst/>
+    <dgm:txLinClrLst/>
+    <dgm:txFillClrLst/>
+    <dgm:txEffectClrLst/>
+  </dgm:styleLbl>
+  <dgm:styleLbl name="node2">
+    <dgm:fillClrLst meth="repeat">
+      <a:schemeClr val="accent1"/>
+    </dgm:fillClrLst>
+    <dgm:linClrLst meth="repeat">
+      <a:schemeClr val="lt1"/>
+    </dgm:linClrLst>
+    <dgm:effectClrLst/>
+    <dgm:txLinClrLst/>
+    <dgm:txFillClrLst/>
+    <dgm:txEffectClrLst/>
+  </dgm:styleLbl>
+  <dgm:styleLbl name="node3">
+    <dgm:fillClrLst meth="repeat">
+      <a:schemeClr val="accent1"/>
+    </dgm:fillClrLst>
+    <dgm:linClrLst meth="repeat">
+      <a:schemeClr val="lt1"/>
+    </dgm:linClrLst>
+    <dgm:effectClrLst/>
+    <dgm:txLinClrLst/>
+    <dgm:txFillClrLst/>
+    <dgm:txEffectClrLst/>
+  </dgm:styleLbl>
+  <dgm:styleLbl name="node4">
+    <dgm:fillClrLst meth="repeat">
+      <a:schemeClr val="accent1"/>
+    </dgm:fillClrLst>
+    <dgm:linClrLst meth="repeat">
+      <a:schemeClr val="lt1"/>
+    </dgm:linClrLst>
+    <dgm:effectClrLst/>
+    <dgm:txLinClrLst/>
+    <dgm:txFillClrLst/>
+    <dgm:txEffectClrLst/>
+  </dgm:styleLbl>
+  <dgm:styleLbl name="fgImgPlace1">
+    <dgm:fillClrLst meth="repeat">
+      <a:schemeClr val="accent1">
+        <a:tint val="50000"/>
+      </a:schemeClr>
+    </dgm:fillClrLst>
+    <dgm:linClrLst meth="repeat">
+      <a:schemeClr val="lt1"/>
+    </dgm:linClrLst>
+    <dgm:effectClrLst/>
+    <dgm:txLinClrLst/>
+    <dgm:txFillClrLst meth="repeat">
+      <a:schemeClr val="lt1"/>
+    </dgm:txFillClrLst>
+    <dgm:txEffectClrLst/>
+  </dgm:styleLbl>
+  <dgm:styleLbl name="alignImgPlace1">
+    <dgm:fillClrLst meth="repeat">
+      <a:schemeClr val="accent1">
+        <a:tint val="50000"/>
+      </a:schemeClr>
+    </dgm:fillClrLst>
+    <dgm:linClrLst meth="repeat">
+      <a:schemeClr val="lt1"/>
+    </dgm:linClrLst>
+    <dgm:effectClrLst/>
+    <dgm:txLinClrLst/>
+    <dgm:txFillClrLst meth="repeat">
+      <a:schemeClr val="lt1"/>
+    </dgm:txFillClrLst>
+    <dgm:txEffectClrLst/>
+  </dgm:styleLbl>
+  <dgm:styleLbl name="bgImgPlace1">
+    <dgm:fillClrLst meth="repeat">
+      <a:schemeClr val="accent1">
+        <a:tint val="50000"/>
+      </a:schemeClr>
+    </dgm:fillClrLst>
+    <dgm:linClrLst meth="repeat">
+      <a:schemeClr val="lt1"/>
+    </dgm:linClrLst>
+    <dgm:effectClrLst/>
+    <dgm:txLinClrLst/>
+    <dgm:txFillClrLst meth="repeat">
+      <a:schemeClr val="lt1"/>
+    </dgm:txFillClrLst>
+    <dgm:txEffectClrLst/>
+  </dgm:styleLbl>
+  <dgm:styleLbl name="sibTrans2D1">
+    <dgm:fillClrLst meth="repeat">
+      <a:schemeClr val="accent1">
+        <a:tint val="60000"/>
+      </a:schemeClr>
+    </dgm:fillClrLst>
+    <dgm:linClrLst meth="repeat">
+      <a:schemeClr val="accent1">
+        <a:tint val="60000"/>
+      </a:schemeClr>
+    </dgm:linClrLst>
+    <dgm:effectClrLst/>
+    <dgm:txLinClrLst/>
+    <dgm:txFillClrLst/>
+    <dgm:txEffectClrLst/>
+  </dgm:styleLbl>
+  <dgm:styleLbl name="fgSibTrans2D1">
+    <dgm:fillClrLst meth="repeat">
+      <a:schemeClr val="accent1">
+        <a:tint val="60000"/>
+      </a:schemeClr>
+    </dgm:fillClrLst>
+    <dgm:linClrLst meth="repeat">
+      <a:schemeClr val="accent1">
+        <a:tint val="60000"/>
+      </a:schemeClr>
+    </dgm:linClrLst>
+    <dgm:effectClrLst/>
+    <dgm:txLinClrLst/>
+    <dgm:txFillClrLst/>
+    <dgm:txEffectClrLst/>
+  </dgm:styleLbl>
+  <dgm:styleLbl name="bgSibTrans2D1">
+    <dgm:fillClrLst meth="repeat">
+      <a:schemeClr val="accent1">
+        <a:tint val="60000"/>
+      </a:schemeClr>
+    </dgm:fillClrLst>
+    <dgm:linClrLst meth="repeat">
+      <a:schemeClr val="accent1">
+        <a:tint val="60000"/>
+      </a:schemeClr>
+    </dgm:linClrLst>
+    <dgm:effectClrLst/>
+    <dgm:txLinClrLst/>
+    <dgm:txFillClrLst/>
+    <dgm:txEffectClrLst/>
+  </dgm:styleLbl>
+  <dgm:styleLbl name="sibTrans1D1">
+    <dgm:fillClrLst meth="repeat">
+      <a:schemeClr val="accent1"/>
+    </dgm:fillClrLst>
+    <dgm:linClrLst meth="repeat">
+      <a:schemeClr val="accent1"/>
+    </dgm:linClrLst>
+    <dgm:effectClrLst/>
+    <dgm:txLinClrLst/>
+    <dgm:txFillClrLst meth="repeat">
+      <a:schemeClr val="tx1"/>
+    </dgm:txFillClrLst>
+    <dgm:txEffectClrLst/>
+  </dgm:styleLbl>
+  <dgm:styleLbl name="callout">
+    <dgm:fillClrLst meth="repeat">
+      <a:schemeClr val="accent1"/>
+    </dgm:fillClrLst>
+    <dgm:linClrLst meth="repeat">
+      <a:schemeClr val="accent1">
+        <a:tint val="50000"/>
+      </a:schemeClr>
+    </dgm:linClrLst>
+    <dgm:effectClrLst/>
+    <dgm:txLinClrLst/>
+    <dgm:txFillClrLst meth="repeat">
+      <a:schemeClr val="tx1"/>
+    </dgm:txFillClrLst>
+    <dgm:txEffectClrLst/>
+  </dgm:styleLbl>
+  <dgm:styleLbl name="asst0">
+    <dgm:fillClrLst meth="repeat">
+      <a:schemeClr val="accent1"/>
+    </dgm:fillClrLst>
+    <dgm:linClrLst meth="repeat">
+      <a:schemeClr val="lt1"/>
+    </dgm:linClrLst>
+    <dgm:effectClrLst/>
+    <dgm:txLinClrLst/>
+    <dgm:txFillClrLst/>
+    <dgm:txEffectClrLst/>
+  </dgm:styleLbl>
+  <dgm:styleLbl name="asst1">
+    <dgm:fillClrLst meth="repeat">
+      <a:schemeClr val="accent1"/>
+    </dgm:fillClrLst>
+    <dgm:linClrLst meth="repeat">
+      <a:schemeClr val="lt1"/>
+    </dgm:linClrLst>
+    <dgm:effectClrLst/>
+    <dgm:txLinClrLst/>
+    <dgm:txFillClrLst/>
+    <dgm:txEffectClrLst/>
+  </dgm:styleLbl>
+  <dgm:styleLbl name="asst2">
+    <dgm:fillClrLst meth="repeat">
+      <a:schemeClr val="accent1"/>
+    </dgm:fillClrLst>
+    <dgm:linClrLst meth="repeat">
+      <a:schemeClr val="lt1"/>
+    </dgm:linClrLst>
+    <dgm:effectClrLst/>
+    <dgm:txLinClrLst/>
+    <dgm:txFillClrLst/>
+    <dgm:txEffectClrLst/>
+  </dgm:styleLbl>
+  <dgm:styleLbl name="asst3">
+    <dgm:fillClrLst meth="repeat">
+      <a:schemeClr val="accent1"/>
+    </dgm:fillClrLst>
+    <dgm:linClrLst meth="repeat">
+      <a:schemeClr val="lt1"/>
+    </dgm:linClrLst>
+    <dgm:effectClrLst/>
+    <dgm:txLinClrLst/>
+    <dgm:txFillClrLst/>
+    <dgm:txEffectClrLst/>
+  </dgm:styleLbl>
+  <dgm:styleLbl name="asst4">
+    <dgm:fillClrLst meth="repeat">
+      <a:schemeClr val="accent1"/>
+    </dgm:fillClrLst>
+    <dgm:linClrLst meth="repeat">
+      <a:schemeClr val="lt1"/>
+    </dgm:linClrLst>
+    <dgm:effectClrLst/>
+    <dgm:txLinClrLst/>
+    <dgm:txFillClrLst/>
+    <dgm:txEffectClrLst/>
+  </dgm:styleLbl>
+  <dgm:styleLbl name="parChTrans2D1">
+    <dgm:fillClrLst meth="repeat">
+      <a:schemeClr val="accent1">
+        <a:tint val="60000"/>
+      </a:schemeClr>
+    </dgm:fillClrLst>
+    <dgm:linClrLst meth="repeat">
+      <a:schemeClr val="accent1">
+        <a:tint val="60000"/>
+      </a:schemeClr>
+    </dgm:linClrLst>
+    <dgm:effectClrLst/>
+    <dgm:txLinClrLst/>
+    <dgm:txFillClrLst meth="repeat">
+      <a:schemeClr val="lt1"/>
+    </dgm:txFillClrLst>
+    <dgm:txEffectClrLst/>
+  </dgm:styleLbl>
+  <dgm:styleLbl name="parChTrans2D2">
+    <dgm:fillClrLst meth="repeat">
+      <a:schemeClr val="accent1"/>
+    </dgm:fillClrLst>
+    <dgm:linClrLst meth="repeat">
+      <a:schemeClr val="accent1"/>
+    </dgm:linClrLst>
+    <dgm:effectClrLst/>
+    <dgm:txLinClrLst/>
+    <dgm:txFillClrLst meth="repeat">
+      <a:schemeClr val="lt1"/>
+    </dgm:txFillClrLst>
+    <dgm:txEffectClrLst/>
+  </dgm:styleLbl>
+  <dgm:styleLbl name="parChTrans2D3">
+    <dgm:fillClrLst meth="repeat">
+      <a:schemeClr val="accent1"/>
+    </dgm:fillClrLst>
+    <dgm:linClrLst meth="repeat">
+      <a:schemeClr val="accent1"/>
+    </dgm:linClrLst>
+    <dgm:effectClrLst/>
+    <dgm:txLinClrLst/>
+    <dgm:txFillClrLst meth="repeat">
+      <a:schemeClr val="lt1"/>
+    </dgm:txFillClrLst>
+    <dgm:txEffectClrLst/>
+  </dgm:styleLbl>
+  <dgm:styleLbl name="parChTrans2D4">
+    <dgm:fillClrLst meth="repeat">
+      <a:schemeClr val="accent1"/>
+    </dgm:fillClrLst>
+    <dgm:linClrLst meth="repeat">
+      <a:schemeClr val="accent1"/>
+    </dgm:linClrLst>
+    <dgm:effectClrLst/>
+    <dgm:txLinClrLst/>
+    <dgm:txFillClrLst meth="repeat">
+      <a:schemeClr val="lt1"/>
+    </dgm:txFillClrLst>
+    <dgm:txEffectClrLst/>
+  </dgm:styleLbl>
+  <dgm:styleLbl name="parChTrans1D1">
+    <dgm:fillClrLst meth="repeat">
+      <a:schemeClr val="accent1"/>
+    </dgm:fillClrLst>
+    <dgm:linClrLst meth="repeat">
+      <a:schemeClr val="accent1">
+        <a:shade val="60000"/>
+      </a:schemeClr>
+    </dgm:linClrLst>
+    <dgm:effectClrLst/>
+    <dgm:txLinClrLst/>
+    <dgm:txFillClrLst meth="repeat">
+      <a:schemeClr val="tx1"/>
+    </dgm:txFillClrLst>
+    <dgm:txEffectClrLst/>
+  </dgm:styleLbl>
+  <dgm:styleLbl name="parChTrans1D2">
+    <dgm:fillClrLst meth="repeat">
+      <a:schemeClr val="accent1"/>
+    </dgm:fillClrLst>
+    <dgm:linClrLst meth="repeat">
+      <a:schemeClr val="accent1">
+        <a:shade val="60000"/>
+      </a:schemeClr>
+    </dgm:linClrLst>
+    <dgm:effectClrLst/>
+    <dgm:txLinClrLst/>
+    <dgm:txFillClrLst meth="repeat">
+      <a:schemeClr val="tx1"/>
+    </dgm:txFillClrLst>
+    <dgm:txEffectClrLst/>
+  </dgm:styleLbl>
+  <dgm:styleLbl name="parChTrans1D3">
+    <dgm:fillClrLst meth="repeat">
+      <a:schemeClr val="accent1"/>
+    </dgm:fillClrLst>
+    <dgm:linClrLst meth="repeat">
+      <a:schemeClr val="accent1">
+        <a:shade val="80000"/>
+      </a:schemeClr>
+    </dgm:linClrLst>
+    <dgm:effectClrLst/>
+    <dgm:txLinClrLst/>
+    <dgm:txFillClrLst meth="repeat">
+      <a:schemeClr val="tx1"/>
+    </dgm:txFillClrLst>
+    <dgm:txEffectClrLst/>
+  </dgm:styleLbl>
+  <dgm:styleLbl name="parChTrans1D4">
+    <dgm:fillClrLst meth="repeat">
+      <a:schemeClr val="accent1"/>
+    </dgm:fillClrLst>
+    <dgm:linClrLst meth="repeat">
+      <a:schemeClr val="accent1">
+        <a:shade val="80000"/>
+      </a:schemeClr>
+    </dgm:linClrLst>
+    <dgm:effectClrLst/>
+    <dgm:txLinClrLst/>
+    <dgm:txFillClrLst meth="repeat">
+      <a:schemeClr val="tx1"/>
+    </dgm:txFillClrLst>
+    <dgm:txEffectClrLst/>
+  </dgm:styleLbl>
+  <dgm:styleLbl name="fgAcc1">
+    <dgm:fillClrLst meth="repeat">
+      <a:schemeClr val="lt1">
+        <a:alpha val="90000"/>
+      </a:schemeClr>
+    </dgm:fillClrLst>
+    <dgm:linClrLst meth="repeat">
+      <a:schemeClr val="accent1"/>
+    </dgm:linClrLst>
+    <dgm:effectClrLst/>
+    <dgm:txLinClrLst/>
+    <dgm:txFillClrLst meth="repeat">
+      <a:schemeClr val="dk1"/>
+    </dgm:txFillClrLst>
+    <dgm:txEffectClrLst/>
+  </dgm:styleLbl>
+  <dgm:styleLbl name="conFgAcc1">
+    <dgm:fillClrLst meth="repeat">
+      <a:schemeClr val="lt1">
+        <a:alpha val="90000"/>
+      </a:schemeClr>
+    </dgm:fillClrLst>
+    <dgm:linClrLst meth="repeat">
+      <a:schemeClr val="accent1"/>
+    </dgm:linClrLst>
+    <dgm:effectClrLst/>
+    <dgm:txLinClrLst/>
+    <dgm:txFillClrLst meth="repeat">
+      <a:schemeClr val="dk1"/>
+    </dgm:txFillClrLst>
+    <dgm:txEffectClrLst/>
+  </dgm:styleLbl>
+  <dgm:styleLbl name="alignAcc1">
+    <dgm:fillClrLst meth="repeat">
+      <a:schemeClr val="lt1">
+        <a:alpha val="90000"/>
+      </a:schemeClr>
+    </dgm:fillClrLst>
+    <dgm:linClrLst meth="repeat">
+      <a:schemeClr val="accent1"/>
+    </dgm:linClrLst>
+    <dgm:effectClrLst/>
+    <dgm:txLinClrLst/>
+    <dgm:txFillClrLst meth="repeat">
+      <a:schemeClr val="dk1"/>
+    </dgm:txFillClrLst>
+    <dgm:txEffectClrLst/>
+  </dgm:styleLbl>
+  <dgm:styleLbl name="trAlignAcc1">
+    <dgm:fillClrLst meth="repeat">
+      <a:schemeClr val="lt1">
+        <a:alpha val="40000"/>
+      </a:schemeClr>
+    </dgm:fillClrLst>
+    <dgm:linClrLst meth="repeat">
+      <a:schemeClr val="accent1"/>
+    </dgm:linClrLst>
+    <dgm:effectClrLst/>
+    <dgm:txLinClrLst/>
+    <dgm:txFillClrLst meth="repeat">
+      <a:schemeClr val="dk1"/>
+    </dgm:txFillClrLst>
+    <dgm:txEffectClrLst/>
+  </dgm:styleLbl>
+  <dgm:styleLbl name="bgAcc1">
+    <dgm:fillClrLst meth="repeat">
+      <a:schemeClr val="lt1">
+        <a:alpha val="90000"/>
+      </a:schemeClr>
+    </dgm:fillClrLst>
+    <dgm:linClrLst meth="repeat">
+      <a:schemeClr val="accent1"/>
+    </dgm:linClrLst>
+    <dgm:effectClrLst/>
+    <dgm:txLinClrLst/>
+    <dgm:txFillClrLst meth="repeat">
+      <a:schemeClr val="dk1"/>
+    </dgm:txFillClrLst>
+    <dgm:txEffectClrLst/>
+  </dgm:styleLbl>
+  <dgm:styleLbl name="solidFgAcc1">
+    <dgm:fillClrLst meth="repeat">
+      <a:schemeClr val="lt1"/>
+    </dgm:fillClrLst>
+    <dgm:linClrLst meth="repeat">
+      <a:schemeClr val="accent1"/>
+    </dgm:linClrLst>
+    <dgm:effectClrLst/>
+    <dgm:txLinClrLst/>
+    <dgm:txFillClrLst meth="repeat">
+      <a:schemeClr val="dk1"/>
+    </dgm:txFillClrLst>
+    <dgm:txEffectClrLst/>
+  </dgm:styleLbl>
+  <dgm:styleLbl name="solidAlignAcc1">
+    <dgm:fillClrLst meth="repeat">
+      <a:schemeClr val="lt1"/>
+    </dgm:fillClrLst>
+    <dgm:linClrLst meth="repeat">
+      <a:schemeClr val="accent1"/>
+    </dgm:linClrLst>
+    <dgm:effectClrLst/>
+    <dgm:txLinClrLst/>
+    <dgm:txFillClrLst meth="repeat">
+      <a:schemeClr val="dk1"/>
+    </dgm:txFillClrLst>
+    <dgm:txEffectClrLst/>
+  </dgm:styleLbl>
+  <dgm:styleLbl name="solidBgAcc1">
+    <dgm:fillClrLst meth="repeat">
+      <a:schemeClr val="lt1"/>
+    </dgm:fillClrLst>
+    <dgm:linClrLst meth="repeat">
+      <a:schemeClr val="accent1"/>
+    </dgm:linClrLst>
+    <dgm:effectClrLst/>
+    <dgm:txLinClrLst/>
+    <dgm:txFillClrLst meth="repeat">
+      <a:schemeClr val="dk1"/>
+    </dgm:txFillClrLst>
+    <dgm:txEffectClrLst/>
+  </dgm:styleLbl>
+  <dgm:styleLbl name="fgAccFollowNode1">
+    <dgm:fillClrLst meth="repeat">
+      <a:schemeClr val="accent1">
+        <a:alpha val="90000"/>
+        <a:tint val="40000"/>
+      </a:schemeClr>
+    </dgm:fillClrLst>
+    <dgm:linClrLst meth="repeat">
+      <a:schemeClr val="accent1">
+        <a:alpha val="90000"/>
+        <a:tint val="40000"/>
+      </a:schemeClr>
+    </dgm:linClrLst>
+    <dgm:effectClrLst/>
+    <dgm:txLinClrLst/>
+    <dgm:txFillClrLst meth="repeat">
+      <a:schemeClr val="dk1"/>
+    </dgm:txFillClrLst>
+    <dgm:txEffectClrLst/>
+  </dgm:styleLbl>
+  <dgm:styleLbl name="alignAccFollowNode1">
+    <dgm:fillClrLst meth="repeat">
+      <a:schemeClr val="accent1">
+        <a:alpha val="90000"/>
+        <a:tint val="40000"/>
+      </a:schemeClr>
+    </dgm:fillClrLst>
+    <dgm:linClrLst meth="repeat">
+      <a:schemeClr val="accent1">
+        <a:alpha val="90000"/>
+        <a:tint val="40000"/>
+      </a:schemeClr>
+    </dgm:linClrLst>
+    <dgm:effectClrLst/>
+    <dgm:txLinClrLst/>
+    <dgm:txFillClrLst meth="repeat">
+      <a:schemeClr val="dk1"/>
+    </dgm:txFillClrLst>
+    <dgm:txEffectClrLst/>
+  </dgm:styleLbl>
+  <dgm:styleLbl name="bgAccFollowNode1">
+    <dgm:fillClrLst meth="repeat">
+      <a:schemeClr val="accent1">
+        <a:alpha val="90000"/>
+        <a:tint val="40000"/>
+      </a:schemeClr>
+    </dgm:fillClrLst>
+    <dgm:linClrLst meth="repeat">
+      <a:schemeClr val="accent1">
+        <a:alpha val="90000"/>
+        <a:tint val="40000"/>
+      </a:schemeClr>
+    </dgm:linClrLst>
+    <dgm:effectClrLst/>
+    <dgm:txLinClrLst/>
+    <dgm:txFillClrLst meth="repeat">
+      <a:schemeClr val="dk1"/>
+    </dgm:txFillClrLst>
+    <dgm:txEffectClrLst/>
+  </dgm:styleLbl>
+  <dgm:styleLbl name="fgAcc0">
+    <dgm:fillClrLst meth="repeat">
+      <a:schemeClr val="lt1">
+        <a:alpha val="90000"/>
+      </a:schemeClr>
+    </dgm:fillClrLst>
+    <dgm:linClrLst meth="repeat">
+      <a:schemeClr val="accent1"/>
+    </dgm:linClrLst>
+    <dgm:effectClrLst/>
+    <dgm:txLinClrLst/>
+    <dgm:txFillClrLst meth="repeat">
+      <a:schemeClr val="dk1"/>
+    </dgm:txFillClrLst>
+    <dgm:txEffectClrLst/>
+  </dgm:styleLbl>
+  <dgm:styleLbl name="fgAcc2">
+    <dgm:fillClrLst meth="repeat">
+      <a:schemeClr val="lt1">
+        <a:alpha val="90000"/>
+      </a:schemeClr>
+    </dgm:fillClrLst>
+    <dgm:linClrLst meth="repeat">
+      <a:schemeClr val="accent1"/>
+    </dgm:linClrLst>
+    <dgm:effectClrLst/>
+    <dgm:txLinClrLst/>
+    <dgm:txFillClrLst meth="repeat">
+      <a:schemeClr val="dk1"/>
+    </dgm:txFillClrLst>
+    <dgm:txEffectClrLst/>
+  </dgm:styleLbl>
+  <dgm:styleLbl name="fgAcc3">
+    <dgm:fillClrLst meth="repeat">
+      <a:schemeClr val="lt1">
+        <a:alpha val="90000"/>
+      </a:schemeClr>
+    </dgm:fillClrLst>
+    <dgm:linClrLst meth="repeat">
+      <a:schemeClr val="accent1"/>
+    </dgm:linClrLst>
+    <dgm:effectClrLst/>
+    <dgm:txLinClrLst/>
+    <dgm:txFillClrLst meth="repeat">
+      <a:schemeClr val="dk1"/>
+    </dgm:txFillClrLst>
+    <dgm:txEffectClrLst/>
+  </dgm:styleLbl>
+  <dgm:styleLbl name="fgAcc4">
+    <dgm:fillClrLst meth="repeat">
+      <a:schemeClr val="lt1">
+        <a:alpha val="90000"/>
+      </a:schemeClr>
+    </dgm:fillClrLst>
+    <dgm:linClrLst meth="repeat">
+      <a:schemeClr val="accent1"/>
+    </dgm:linClrLst>
+    <dgm:effectClrLst/>
+    <dgm:txLinClrLst/>
+    <dgm:txFillClrLst meth="repeat">
+      <a:schemeClr val="dk1"/>
+    </dgm:txFillClrLst>
+    <dgm:txEffectClrLst/>
+  </dgm:styleLbl>
+  <dgm:styleLbl name="bgShp">
+    <dgm:fillClrLst meth="repeat">
+      <a:schemeClr val="accent1">
+        <a:tint val="40000"/>
+      </a:schemeClr>
+    </dgm:fillClrLst>
+    <dgm:linClrLst meth="repeat">
+      <a:schemeClr val="accent1"/>
+    </dgm:linClrLst>
+    <dgm:effectClrLst/>
+    <dgm:txLinClrLst/>
+    <dgm:txFillClrLst meth="repeat">
+      <a:schemeClr val="dk1"/>
+    </dgm:txFillClrLst>
+    <dgm:txEffectClrLst/>
+  </dgm:styleLbl>
+  <dgm:styleLbl name="dkBgShp">
+    <dgm:fillClrLst meth="repeat">
+      <a:schemeClr val="accent1">
+        <a:shade val="80000"/>
+      </a:schemeClr>
+    </dgm:fillClrLst>
+    <dgm:linClrLst meth="repeat">
+      <a:schemeClr val="accent1"/>
+    </dgm:linClrLst>
+    <dgm:effectClrLst/>
+    <dgm:txLinClrLst/>
+    <dgm:txFillClrLst meth="repeat">
+      <a:schemeClr val="lt1"/>
+    </dgm:txFillClrLst>
+    <dgm:txEffectClrLst/>
+  </dgm:styleLbl>
+  <dgm:styleLbl name="trBgShp">
+    <dgm:fillClrLst meth="repeat">
+      <a:schemeClr val="accent1">
+        <a:tint val="50000"/>
+        <a:alpha val="40000"/>
+      </a:schemeClr>
+    </dgm:fillClrLst>
+    <dgm:linClrLst meth="repeat">
+      <a:schemeClr val="accent1"/>
+    </dgm:linClrLst>
+    <dgm:effectClrLst/>
+    <dgm:txLinClrLst/>
+    <dgm:txFillClrLst meth="repeat">
+      <a:schemeClr val="lt1"/>
+    </dgm:txFillClrLst>
+    <dgm:txEffectClrLst/>
+  </dgm:styleLbl>
+  <dgm:styleLbl name="fgShp">
+    <dgm:fillClrLst meth="repeat">
+      <a:schemeClr val="accent1">
+        <a:tint val="60000"/>
+      </a:schemeClr>
+    </dgm:fillClrLst>
+    <dgm:linClrLst meth="repeat">
+      <a:schemeClr val="lt1"/>
+    </dgm:linClrLst>
+    <dgm:effectClrLst/>
+    <dgm:txLinClrLst/>
+    <dgm:txFillClrLst meth="repeat">
+      <a:schemeClr val="dk1"/>
+    </dgm:txFillClrLst>
+    <dgm:txEffectClrLst/>
+  </dgm:styleLbl>
+  <dgm:styleLbl name="revTx">
+    <dgm:fillClrLst meth="repeat">
+      <a:schemeClr val="lt1">
+        <a:alpha val="0"/>
+      </a:schemeClr>
+    </dgm:fillClrLst>
+    <dgm:linClrLst meth="repeat">
+      <a:schemeClr val="dk1">
+        <a:alpha val="0"/>
+      </a:schemeClr>
+    </dgm:linClrLst>
+    <dgm:effectClrLst/>
+    <dgm:txLinClrLst/>
+    <dgm:txFillClrLst meth="repeat">
+      <a:schemeClr val="tx1"/>
+    </dgm:txFillClrLst>
+    <dgm:txEffectClrLst/>
+  </dgm:styleLbl>
+</dgm:colorsDef>
+</file>
+
+<file path=ppt/diagrams/data1.xml><?xml version="1.0" encoding="utf-8"?>
+<dgm:dataModel xmlns:dgm="http://schemas.openxmlformats.org/drawingml/2006/diagram" xmlns:a="http://schemas.openxmlformats.org/drawingml/2006/main">
+  <dgm:ptLst>
+    <dgm:pt modelId="{D523A96A-2AF0-4FFA-92F8-DD67DC51867B}" type="doc">
+      <dgm:prSet loTypeId="urn:microsoft.com/office/officeart/2005/8/layout/process1" loCatId="process" qsTypeId="urn:microsoft.com/office/officeart/2005/8/quickstyle/simple1" qsCatId="simple" csTypeId="urn:microsoft.com/office/officeart/2005/8/colors/accent1_2" csCatId="accent1" phldr="1"/>
+      <dgm:spPr/>
+      <dgm:t>
+        <a:bodyPr/>
+        <a:lstStyle/>
+        <a:p>
+          <a:endParaRPr lang="en-US"/>
+        </a:p>
+      </dgm:t>
+    </dgm:pt>
+    <dgm:pt modelId="{5B9A23B2-9BC2-4E5B-A470-FC3ACBB79F8C}">
+      <dgm:prSet/>
+      <dgm:spPr/>
+      <dgm:t>
+        <a:bodyPr/>
+        <a:lstStyle/>
+        <a:p>
+          <a:r>
+            <a:rPr lang="en-GB" dirty="0"/>
+            <a:t>The blue will be used in place of the Health Advice Group logo to identify it is about health (NHS)</a:t>
+          </a:r>
+          <a:endParaRPr lang="en-US" dirty="0"/>
+        </a:p>
+      </dgm:t>
+    </dgm:pt>
+    <dgm:pt modelId="{E079372E-124D-4847-936F-95747BBFB02A}" type="parTrans" cxnId="{1EC615E5-0758-4BF6-AB67-AC292534BFA5}">
+      <dgm:prSet/>
+      <dgm:spPr/>
+      <dgm:t>
+        <a:bodyPr/>
+        <a:lstStyle/>
+        <a:p>
+          <a:endParaRPr lang="en-US"/>
+        </a:p>
+      </dgm:t>
+    </dgm:pt>
+    <dgm:pt modelId="{8E636985-A24E-4464-83FB-8DD4F137E14C}" type="sibTrans" cxnId="{1EC615E5-0758-4BF6-AB67-AC292534BFA5}">
+      <dgm:prSet/>
+      <dgm:spPr/>
+      <dgm:t>
+        <a:bodyPr/>
+        <a:lstStyle/>
+        <a:p>
+          <a:endParaRPr lang="en-US"/>
+        </a:p>
+      </dgm:t>
+    </dgm:pt>
+    <dgm:pt modelId="{651340A1-7563-4F47-837E-1DDF3527CD7E}">
+      <dgm:prSet/>
+      <dgm:spPr/>
+      <dgm:t>
+        <a:bodyPr/>
+        <a:lstStyle/>
+        <a:p>
+          <a:r>
+            <a:rPr lang="en-GB" dirty="0"/>
+            <a:t>Black will be used for the buttons in contrast with the white background</a:t>
+          </a:r>
+          <a:endParaRPr lang="en-US" dirty="0"/>
+        </a:p>
+      </dgm:t>
+    </dgm:pt>
+    <dgm:pt modelId="{37E0F6C6-9DF2-4231-934D-A965B46365E9}" type="parTrans" cxnId="{9F07ACA1-C85D-4B55-A365-42DB6D703CF4}">
+      <dgm:prSet/>
+      <dgm:spPr/>
+      <dgm:t>
+        <a:bodyPr/>
+        <a:lstStyle/>
+        <a:p>
+          <a:endParaRPr lang="en-US"/>
+        </a:p>
+      </dgm:t>
+    </dgm:pt>
+    <dgm:pt modelId="{A5802288-71E1-472B-A951-B162C8AFC674}" type="sibTrans" cxnId="{9F07ACA1-C85D-4B55-A365-42DB6D703CF4}">
+      <dgm:prSet/>
+      <dgm:spPr/>
+      <dgm:t>
+        <a:bodyPr/>
+        <a:lstStyle/>
+        <a:p>
+          <a:endParaRPr lang="en-US"/>
+        </a:p>
+      </dgm:t>
+    </dgm:pt>
+    <dgm:pt modelId="{5B4DECF7-2CC7-47F5-87BE-DF88BF3799C7}">
+      <dgm:prSet/>
+      <dgm:spPr/>
+      <dgm:t>
+        <a:bodyPr/>
+        <a:lstStyle/>
+        <a:p>
+          <a:r>
+            <a:rPr lang="en-GB" dirty="0"/>
+            <a:t>Yellow will be used to contrast to the black button to highlight the user is over a button</a:t>
+          </a:r>
+          <a:endParaRPr lang="en-US" dirty="0"/>
+        </a:p>
+      </dgm:t>
+    </dgm:pt>
+    <dgm:pt modelId="{A81742E8-855D-4C34-92A6-6C5E1D6A3DFC}" type="parTrans" cxnId="{DC55E989-9291-4778-9201-52CDCAC04E7A}">
+      <dgm:prSet/>
+      <dgm:spPr/>
+      <dgm:t>
+        <a:bodyPr/>
+        <a:lstStyle/>
+        <a:p>
+          <a:endParaRPr lang="en-US"/>
+        </a:p>
+      </dgm:t>
+    </dgm:pt>
+    <dgm:pt modelId="{ACA3EBEC-7000-4C94-B78B-0F8C2B06A309}" type="sibTrans" cxnId="{DC55E989-9291-4778-9201-52CDCAC04E7A}">
+      <dgm:prSet/>
+      <dgm:spPr/>
+      <dgm:t>
+        <a:bodyPr/>
+        <a:lstStyle/>
+        <a:p>
+          <a:endParaRPr lang="en-US"/>
+        </a:p>
+      </dgm:t>
+    </dgm:pt>
+    <dgm:pt modelId="{16319FC7-2052-49DC-A538-EB16B2DE8F71}">
+      <dgm:prSet/>
+      <dgm:spPr/>
+      <dgm:t>
+        <a:bodyPr/>
+        <a:lstStyle/>
+        <a:p>
+          <a:r>
+            <a:rPr lang="en-GB" dirty="0"/>
+            <a:t>Green will be used for the buttons to complete forms and anything that may be processed (log in button, form completed button, etc)</a:t>
+          </a:r>
+          <a:endParaRPr lang="en-US" dirty="0"/>
+        </a:p>
+      </dgm:t>
+    </dgm:pt>
+    <dgm:pt modelId="{2BA8BAA0-6764-4D22-A82A-3DC0C7A0935B}" type="parTrans" cxnId="{6AF65DB5-CF41-4DEA-8DCB-CD467E521987}">
+      <dgm:prSet/>
+      <dgm:spPr/>
+      <dgm:t>
+        <a:bodyPr/>
+        <a:lstStyle/>
+        <a:p>
+          <a:endParaRPr lang="en-US"/>
+        </a:p>
+      </dgm:t>
+    </dgm:pt>
+    <dgm:pt modelId="{9D3F6EB1-B761-42A3-8769-D0488A3F8DA6}" type="sibTrans" cxnId="{6AF65DB5-CF41-4DEA-8DCB-CD467E521987}">
+      <dgm:prSet/>
+      <dgm:spPr/>
+      <dgm:t>
+        <a:bodyPr/>
+        <a:lstStyle/>
+        <a:p>
+          <a:endParaRPr lang="en-US"/>
+        </a:p>
+      </dgm:t>
+    </dgm:pt>
+    <dgm:pt modelId="{4ED7DBCF-4374-4F76-8011-94576D775709}" type="pres">
+      <dgm:prSet presAssocID="{D523A96A-2AF0-4FFA-92F8-DD67DC51867B}" presName="Name0" presStyleCnt="0">
+        <dgm:presLayoutVars>
+          <dgm:dir/>
+          <dgm:resizeHandles val="exact"/>
+        </dgm:presLayoutVars>
+      </dgm:prSet>
+      <dgm:spPr/>
+    </dgm:pt>
+    <dgm:pt modelId="{2F63AD75-CDC4-4D86-8813-711B882F3BE2}" type="pres">
+      <dgm:prSet presAssocID="{5B9A23B2-9BC2-4E5B-A470-FC3ACBB79F8C}" presName="node" presStyleLbl="node1" presStyleIdx="0" presStyleCnt="4">
+        <dgm:presLayoutVars>
+          <dgm:bulletEnabled val="1"/>
+        </dgm:presLayoutVars>
+      </dgm:prSet>
+      <dgm:spPr/>
+    </dgm:pt>
+    <dgm:pt modelId="{F615AB50-D8E0-417D-B766-9787B9AF62A3}" type="pres">
+      <dgm:prSet presAssocID="{8E636985-A24E-4464-83FB-8DD4F137E14C}" presName="sibTrans" presStyleLbl="sibTrans2D1" presStyleIdx="0" presStyleCnt="3"/>
+      <dgm:spPr/>
+    </dgm:pt>
+    <dgm:pt modelId="{56A55BBB-6E38-4B38-B0A1-D84A369E2108}" type="pres">
+      <dgm:prSet presAssocID="{8E636985-A24E-4464-83FB-8DD4F137E14C}" presName="connectorText" presStyleLbl="sibTrans2D1" presStyleIdx="0" presStyleCnt="3"/>
+      <dgm:spPr/>
+    </dgm:pt>
+    <dgm:pt modelId="{44E5C1EC-243C-4997-A794-685AE6481737}" type="pres">
+      <dgm:prSet presAssocID="{651340A1-7563-4F47-837E-1DDF3527CD7E}" presName="node" presStyleLbl="node1" presStyleIdx="1" presStyleCnt="4">
+        <dgm:presLayoutVars>
+          <dgm:bulletEnabled val="1"/>
+        </dgm:presLayoutVars>
+      </dgm:prSet>
+      <dgm:spPr/>
+    </dgm:pt>
+    <dgm:pt modelId="{36CD6E2C-CFD1-4B57-8963-554BC78C1355}" type="pres">
+      <dgm:prSet presAssocID="{A5802288-71E1-472B-A951-B162C8AFC674}" presName="sibTrans" presStyleLbl="sibTrans2D1" presStyleIdx="1" presStyleCnt="3"/>
+      <dgm:spPr/>
+    </dgm:pt>
+    <dgm:pt modelId="{A80317E1-60C2-45D8-8FA8-96A5E49B39D4}" type="pres">
+      <dgm:prSet presAssocID="{A5802288-71E1-472B-A951-B162C8AFC674}" presName="connectorText" presStyleLbl="sibTrans2D1" presStyleIdx="1" presStyleCnt="3"/>
+      <dgm:spPr/>
+    </dgm:pt>
+    <dgm:pt modelId="{1A193D5F-240E-4526-AF71-8E0A5EFBB6DA}" type="pres">
+      <dgm:prSet presAssocID="{5B4DECF7-2CC7-47F5-87BE-DF88BF3799C7}" presName="node" presStyleLbl="node1" presStyleIdx="2" presStyleCnt="4">
+        <dgm:presLayoutVars>
+          <dgm:bulletEnabled val="1"/>
+        </dgm:presLayoutVars>
+      </dgm:prSet>
+      <dgm:spPr/>
+    </dgm:pt>
+    <dgm:pt modelId="{41853145-FE48-4A27-A2E2-6D70B4109A98}" type="pres">
+      <dgm:prSet presAssocID="{ACA3EBEC-7000-4C94-B78B-0F8C2B06A309}" presName="sibTrans" presStyleLbl="sibTrans2D1" presStyleIdx="2" presStyleCnt="3"/>
+      <dgm:spPr/>
+    </dgm:pt>
+    <dgm:pt modelId="{9DEE6947-9EFF-4318-AF77-CD986BDAA0CB}" type="pres">
+      <dgm:prSet presAssocID="{ACA3EBEC-7000-4C94-B78B-0F8C2B06A309}" presName="connectorText" presStyleLbl="sibTrans2D1" presStyleIdx="2" presStyleCnt="3"/>
+      <dgm:spPr/>
+    </dgm:pt>
+    <dgm:pt modelId="{8453ADD8-A0DA-446D-ACBB-698D758B4FC3}" type="pres">
+      <dgm:prSet presAssocID="{16319FC7-2052-49DC-A538-EB16B2DE8F71}" presName="node" presStyleLbl="node1" presStyleIdx="3" presStyleCnt="4">
+        <dgm:presLayoutVars>
+          <dgm:bulletEnabled val="1"/>
+        </dgm:presLayoutVars>
+      </dgm:prSet>
+      <dgm:spPr/>
+    </dgm:pt>
+  </dgm:ptLst>
+  <dgm:cxnLst>
+    <dgm:cxn modelId="{4B947033-A3D5-441A-8145-3E52708A5577}" type="presOf" srcId="{ACA3EBEC-7000-4C94-B78B-0F8C2B06A309}" destId="{9DEE6947-9EFF-4318-AF77-CD986BDAA0CB}" srcOrd="1" destOrd="0" presId="urn:microsoft.com/office/officeart/2005/8/layout/process1"/>
+    <dgm:cxn modelId="{0C15C35C-99B4-4533-A944-D71D51455F72}" type="presOf" srcId="{651340A1-7563-4F47-837E-1DDF3527CD7E}" destId="{44E5C1EC-243C-4997-A794-685AE6481737}" srcOrd="0" destOrd="0" presId="urn:microsoft.com/office/officeart/2005/8/layout/process1"/>
+    <dgm:cxn modelId="{E12D4D48-0974-4638-B957-3C7AFB9F43F4}" type="presOf" srcId="{8E636985-A24E-4464-83FB-8DD4F137E14C}" destId="{F615AB50-D8E0-417D-B766-9787B9AF62A3}" srcOrd="0" destOrd="0" presId="urn:microsoft.com/office/officeart/2005/8/layout/process1"/>
+    <dgm:cxn modelId="{27EDFF5A-5F5A-427C-A5BE-E43603986893}" type="presOf" srcId="{16319FC7-2052-49DC-A538-EB16B2DE8F71}" destId="{8453ADD8-A0DA-446D-ACBB-698D758B4FC3}" srcOrd="0" destOrd="0" presId="urn:microsoft.com/office/officeart/2005/8/layout/process1"/>
+    <dgm:cxn modelId="{DC55E989-9291-4778-9201-52CDCAC04E7A}" srcId="{D523A96A-2AF0-4FFA-92F8-DD67DC51867B}" destId="{5B4DECF7-2CC7-47F5-87BE-DF88BF3799C7}" srcOrd="2" destOrd="0" parTransId="{A81742E8-855D-4C34-92A6-6C5E1D6A3DFC}" sibTransId="{ACA3EBEC-7000-4C94-B78B-0F8C2B06A309}"/>
+    <dgm:cxn modelId="{18BF1E93-3259-4C82-9FBB-2824545884AD}" type="presOf" srcId="{8E636985-A24E-4464-83FB-8DD4F137E14C}" destId="{56A55BBB-6E38-4B38-B0A1-D84A369E2108}" srcOrd="1" destOrd="0" presId="urn:microsoft.com/office/officeart/2005/8/layout/process1"/>
+    <dgm:cxn modelId="{1AD3FA9A-8189-4D9C-83F2-3ABF13DC8CE3}" type="presOf" srcId="{A5802288-71E1-472B-A951-B162C8AFC674}" destId="{A80317E1-60C2-45D8-8FA8-96A5E49B39D4}" srcOrd="1" destOrd="0" presId="urn:microsoft.com/office/officeart/2005/8/layout/process1"/>
+    <dgm:cxn modelId="{9F07ACA1-C85D-4B55-A365-42DB6D703CF4}" srcId="{D523A96A-2AF0-4FFA-92F8-DD67DC51867B}" destId="{651340A1-7563-4F47-837E-1DDF3527CD7E}" srcOrd="1" destOrd="0" parTransId="{37E0F6C6-9DF2-4231-934D-A965B46365E9}" sibTransId="{A5802288-71E1-472B-A951-B162C8AFC674}"/>
+    <dgm:cxn modelId="{515FC0AF-A63B-47E5-A5E6-484576E406D6}" type="presOf" srcId="{D523A96A-2AF0-4FFA-92F8-DD67DC51867B}" destId="{4ED7DBCF-4374-4F76-8011-94576D775709}" srcOrd="0" destOrd="0" presId="urn:microsoft.com/office/officeart/2005/8/layout/process1"/>
+    <dgm:cxn modelId="{742091B4-AD00-49F0-A2F1-B079DD37E837}" type="presOf" srcId="{5B9A23B2-9BC2-4E5B-A470-FC3ACBB79F8C}" destId="{2F63AD75-CDC4-4D86-8813-711B882F3BE2}" srcOrd="0" destOrd="0" presId="urn:microsoft.com/office/officeart/2005/8/layout/process1"/>
+    <dgm:cxn modelId="{6AF65DB5-CF41-4DEA-8DCB-CD467E521987}" srcId="{D523A96A-2AF0-4FFA-92F8-DD67DC51867B}" destId="{16319FC7-2052-49DC-A538-EB16B2DE8F71}" srcOrd="3" destOrd="0" parTransId="{2BA8BAA0-6764-4D22-A82A-3DC0C7A0935B}" sibTransId="{9D3F6EB1-B761-42A3-8769-D0488A3F8DA6}"/>
+    <dgm:cxn modelId="{0C47FDC6-FA29-4A71-A017-B49B0B13F3F2}" type="presOf" srcId="{ACA3EBEC-7000-4C94-B78B-0F8C2B06A309}" destId="{41853145-FE48-4A27-A2E2-6D70B4109A98}" srcOrd="0" destOrd="0" presId="urn:microsoft.com/office/officeart/2005/8/layout/process1"/>
+    <dgm:cxn modelId="{DE81B8DC-CD3D-4F95-8004-21FECF1D882A}" type="presOf" srcId="{A5802288-71E1-472B-A951-B162C8AFC674}" destId="{36CD6E2C-CFD1-4B57-8963-554BC78C1355}" srcOrd="0" destOrd="0" presId="urn:microsoft.com/office/officeart/2005/8/layout/process1"/>
+    <dgm:cxn modelId="{1EC615E5-0758-4BF6-AB67-AC292534BFA5}" srcId="{D523A96A-2AF0-4FFA-92F8-DD67DC51867B}" destId="{5B9A23B2-9BC2-4E5B-A470-FC3ACBB79F8C}" srcOrd="0" destOrd="0" parTransId="{E079372E-124D-4847-936F-95747BBFB02A}" sibTransId="{8E636985-A24E-4464-83FB-8DD4F137E14C}"/>
+    <dgm:cxn modelId="{7BD6B3EF-8E88-4520-8B83-C4BEDE9CD89D}" type="presOf" srcId="{5B4DECF7-2CC7-47F5-87BE-DF88BF3799C7}" destId="{1A193D5F-240E-4526-AF71-8E0A5EFBB6DA}" srcOrd="0" destOrd="0" presId="urn:microsoft.com/office/officeart/2005/8/layout/process1"/>
+    <dgm:cxn modelId="{7D6E6D44-08B5-40F1-A171-766DFCB79BF5}" type="presParOf" srcId="{4ED7DBCF-4374-4F76-8011-94576D775709}" destId="{2F63AD75-CDC4-4D86-8813-711B882F3BE2}" srcOrd="0" destOrd="0" presId="urn:microsoft.com/office/officeart/2005/8/layout/process1"/>
+    <dgm:cxn modelId="{06E3A3F9-E87B-4DCB-A145-2CABCDF41673}" type="presParOf" srcId="{4ED7DBCF-4374-4F76-8011-94576D775709}" destId="{F615AB50-D8E0-417D-B766-9787B9AF62A3}" srcOrd="1" destOrd="0" presId="urn:microsoft.com/office/officeart/2005/8/layout/process1"/>
+    <dgm:cxn modelId="{61352527-0658-47BA-B6A9-EC2A6A2C48FB}" type="presParOf" srcId="{F615AB50-D8E0-417D-B766-9787B9AF62A3}" destId="{56A55BBB-6E38-4B38-B0A1-D84A369E2108}" srcOrd="0" destOrd="0" presId="urn:microsoft.com/office/officeart/2005/8/layout/process1"/>
+    <dgm:cxn modelId="{56F22400-D069-42A4-8818-48A1F1867658}" type="presParOf" srcId="{4ED7DBCF-4374-4F76-8011-94576D775709}" destId="{44E5C1EC-243C-4997-A794-685AE6481737}" srcOrd="2" destOrd="0" presId="urn:microsoft.com/office/officeart/2005/8/layout/process1"/>
+    <dgm:cxn modelId="{2B2CBCD0-9D0C-4064-9C15-87EED286B479}" type="presParOf" srcId="{4ED7DBCF-4374-4F76-8011-94576D775709}" destId="{36CD6E2C-CFD1-4B57-8963-554BC78C1355}" srcOrd="3" destOrd="0" presId="urn:microsoft.com/office/officeart/2005/8/layout/process1"/>
+    <dgm:cxn modelId="{EDEACB85-1331-4FB1-8334-D23BCD08B549}" type="presParOf" srcId="{36CD6E2C-CFD1-4B57-8963-554BC78C1355}" destId="{A80317E1-60C2-45D8-8FA8-96A5E49B39D4}" srcOrd="0" destOrd="0" presId="urn:microsoft.com/office/officeart/2005/8/layout/process1"/>
+    <dgm:cxn modelId="{E7F1A590-D8F7-47F3-89F5-1E37E4D80316}" type="presParOf" srcId="{4ED7DBCF-4374-4F76-8011-94576D775709}" destId="{1A193D5F-240E-4526-AF71-8E0A5EFBB6DA}" srcOrd="4" destOrd="0" presId="urn:microsoft.com/office/officeart/2005/8/layout/process1"/>
+    <dgm:cxn modelId="{A5EDCC80-5024-4212-91CD-2B4086B5CC18}" type="presParOf" srcId="{4ED7DBCF-4374-4F76-8011-94576D775709}" destId="{41853145-FE48-4A27-A2E2-6D70B4109A98}" srcOrd="5" destOrd="0" presId="urn:microsoft.com/office/officeart/2005/8/layout/process1"/>
+    <dgm:cxn modelId="{70FC4D43-AD70-4BD8-9B35-A0EAB128AF5D}" type="presParOf" srcId="{41853145-FE48-4A27-A2E2-6D70B4109A98}" destId="{9DEE6947-9EFF-4318-AF77-CD986BDAA0CB}" srcOrd="0" destOrd="0" presId="urn:microsoft.com/office/officeart/2005/8/layout/process1"/>
+    <dgm:cxn modelId="{64FDA587-EBA7-4EDE-86DB-814A4230D834}" type="presParOf" srcId="{4ED7DBCF-4374-4F76-8011-94576D775709}" destId="{8453ADD8-A0DA-446D-ACBB-698D758B4FC3}" srcOrd="6" destOrd="0" presId="urn:microsoft.com/office/officeart/2005/8/layout/process1"/>
+  </dgm:cxnLst>
+  <dgm:bg/>
+  <dgm:whole/>
+  <dgm:extLst>
+    <a:ext uri="http://schemas.microsoft.com/office/drawing/2008/diagram">
+      <dsp:dataModelExt xmlns:dsp="http://schemas.microsoft.com/office/drawing/2008/diagram" relId="rId10" minVer="http://schemas.openxmlformats.org/drawingml/2006/diagram"/>
+    </a:ext>
+  </dgm:extLst>
+</dgm:dataModel>
+</file>
+
+<file path=ppt/diagrams/drawing1.xml><?xml version="1.0" encoding="utf-8"?>
+<dsp:drawing xmlns:dgm="http://schemas.openxmlformats.org/drawingml/2006/diagram" xmlns:dsp="http://schemas.microsoft.com/office/drawing/2008/diagram" xmlns:a="http://schemas.openxmlformats.org/drawingml/2006/main">
+  <dsp:spTree>
+    <dsp:nvGrpSpPr>
+      <dsp:cNvPr id="0" name=""/>
+      <dsp:cNvGrpSpPr/>
+    </dsp:nvGrpSpPr>
+    <dsp:grpSpPr/>
+    <dsp:sp modelId="{2F63AD75-CDC4-4D86-8813-711B882F3BE2}">
+      <dsp:nvSpPr>
+        <dsp:cNvPr id="0" name=""/>
+        <dsp:cNvSpPr/>
+      </dsp:nvSpPr>
+      <dsp:spPr>
+        <a:xfrm>
+          <a:off x="5010" y="0"/>
+          <a:ext cx="2190882" cy="1477328"/>
+        </a:xfrm>
+        <a:prstGeom prst="roundRect">
+          <a:avLst>
+            <a:gd name="adj" fmla="val 10000"/>
+          </a:avLst>
+        </a:prstGeom>
+        <a:solidFill>
+          <a:schemeClr val="accent1">
+            <a:hueOff val="0"/>
+            <a:satOff val="0"/>
+            <a:lumOff val="0"/>
+            <a:alphaOff val="0"/>
+          </a:schemeClr>
+        </a:solidFill>
+        <a:ln w="19050" cap="flat" cmpd="sng" algn="ctr">
+          <a:solidFill>
+            <a:schemeClr val="lt1">
+              <a:hueOff val="0"/>
+              <a:satOff val="0"/>
+              <a:lumOff val="0"/>
+              <a:alphaOff val="0"/>
+            </a:schemeClr>
+          </a:solidFill>
+          <a:prstDash val="solid"/>
+          <a:miter lim="800000"/>
+        </a:ln>
+        <a:effectLst/>
+      </dsp:spPr>
+      <dsp:style>
+        <a:lnRef idx="2">
+          <a:scrgbClr r="0" g="0" b="0"/>
+        </a:lnRef>
+        <a:fillRef idx="1">
+          <a:scrgbClr r="0" g="0" b="0"/>
+        </a:fillRef>
+        <a:effectRef idx="0">
+          <a:scrgbClr r="0" g="0" b="0"/>
+        </a:effectRef>
+        <a:fontRef idx="minor">
+          <a:schemeClr val="lt1"/>
+        </a:fontRef>
+      </dsp:style>
+      <dsp:txBody>
+        <a:bodyPr spcFirstLastPara="0" vert="horz" wrap="square" lIns="57150" tIns="57150" rIns="57150" bIns="57150" numCol="1" spcCol="1270" anchor="ctr" anchorCtr="0">
+          <a:noAutofit/>
+        </a:bodyPr>
+        <a:lstStyle/>
+        <a:p>
+          <a:pPr marL="0" lvl="0" indent="0" algn="ctr" defTabSz="666750">
+            <a:lnSpc>
+              <a:spcPct val="90000"/>
+            </a:lnSpc>
+            <a:spcBef>
+              <a:spcPct val="0"/>
+            </a:spcBef>
+            <a:spcAft>
+              <a:spcPct val="35000"/>
+            </a:spcAft>
+            <a:buNone/>
+          </a:pPr>
+          <a:r>
+            <a:rPr lang="en-GB" sz="1500" kern="1200" dirty="0"/>
+            <a:t>The blue will be used in place of the Health Advice Group logo to identify it is about health (NHS)</a:t>
+          </a:r>
+          <a:endParaRPr lang="en-US" sz="1500" kern="1200" dirty="0"/>
+        </a:p>
+      </dsp:txBody>
+      <dsp:txXfrm>
+        <a:off x="48279" y="43269"/>
+        <a:ext cx="2104344" cy="1390790"/>
+      </dsp:txXfrm>
+    </dsp:sp>
+    <dsp:sp modelId="{F615AB50-D8E0-417D-B766-9787B9AF62A3}">
+      <dsp:nvSpPr>
+        <dsp:cNvPr id="0" name=""/>
+        <dsp:cNvSpPr/>
+      </dsp:nvSpPr>
+      <dsp:spPr>
+        <a:xfrm>
+          <a:off x="2414981" y="466994"/>
+          <a:ext cx="464467" cy="543338"/>
+        </a:xfrm>
+        <a:prstGeom prst="rightArrow">
+          <a:avLst>
+            <a:gd name="adj1" fmla="val 60000"/>
+            <a:gd name="adj2" fmla="val 50000"/>
+          </a:avLst>
+        </a:prstGeom>
+        <a:solidFill>
+          <a:schemeClr val="accent1">
+            <a:tint val="60000"/>
+            <a:hueOff val="0"/>
+            <a:satOff val="0"/>
+            <a:lumOff val="0"/>
+            <a:alphaOff val="0"/>
+          </a:schemeClr>
+        </a:solidFill>
+        <a:ln>
+          <a:noFill/>
+        </a:ln>
+        <a:effectLst/>
+      </dsp:spPr>
+      <dsp:style>
+        <a:lnRef idx="0">
+          <a:scrgbClr r="0" g="0" b="0"/>
+        </a:lnRef>
+        <a:fillRef idx="1">
+          <a:scrgbClr r="0" g="0" b="0"/>
+        </a:fillRef>
+        <a:effectRef idx="0">
+          <a:scrgbClr r="0" g="0" b="0"/>
+        </a:effectRef>
+        <a:fontRef idx="minor">
+          <a:schemeClr val="lt1"/>
+        </a:fontRef>
+      </dsp:style>
+      <dsp:txBody>
+        <a:bodyPr spcFirstLastPara="0" vert="horz" wrap="square" lIns="0" tIns="0" rIns="0" bIns="0" numCol="1" spcCol="1270" anchor="ctr" anchorCtr="0">
+          <a:noAutofit/>
+        </a:bodyPr>
+        <a:lstStyle/>
+        <a:p>
+          <a:pPr marL="0" lvl="0" indent="0" algn="ctr" defTabSz="533400">
+            <a:lnSpc>
+              <a:spcPct val="90000"/>
+            </a:lnSpc>
+            <a:spcBef>
+              <a:spcPct val="0"/>
+            </a:spcBef>
+            <a:spcAft>
+              <a:spcPct val="35000"/>
+            </a:spcAft>
+            <a:buNone/>
+          </a:pPr>
+          <a:endParaRPr lang="en-US" sz="1200" kern="1200"/>
+        </a:p>
+      </dsp:txBody>
+      <dsp:txXfrm>
+        <a:off x="2414981" y="575662"/>
+        <a:ext cx="325127" cy="326002"/>
+      </dsp:txXfrm>
+    </dsp:sp>
+    <dsp:sp modelId="{44E5C1EC-243C-4997-A794-685AE6481737}">
+      <dsp:nvSpPr>
+        <dsp:cNvPr id="0" name=""/>
+        <dsp:cNvSpPr/>
+      </dsp:nvSpPr>
+      <dsp:spPr>
+        <a:xfrm>
+          <a:off x="3072245" y="0"/>
+          <a:ext cx="2190882" cy="1477328"/>
+        </a:xfrm>
+        <a:prstGeom prst="roundRect">
+          <a:avLst>
+            <a:gd name="adj" fmla="val 10000"/>
+          </a:avLst>
+        </a:prstGeom>
+        <a:solidFill>
+          <a:schemeClr val="accent1">
+            <a:hueOff val="0"/>
+            <a:satOff val="0"/>
+            <a:lumOff val="0"/>
+            <a:alphaOff val="0"/>
+          </a:schemeClr>
+        </a:solidFill>
+        <a:ln w="19050" cap="flat" cmpd="sng" algn="ctr">
+          <a:solidFill>
+            <a:schemeClr val="lt1">
+              <a:hueOff val="0"/>
+              <a:satOff val="0"/>
+              <a:lumOff val="0"/>
+              <a:alphaOff val="0"/>
+            </a:schemeClr>
+          </a:solidFill>
+          <a:prstDash val="solid"/>
+          <a:miter lim="800000"/>
+        </a:ln>
+        <a:effectLst/>
+      </dsp:spPr>
+      <dsp:style>
+        <a:lnRef idx="2">
+          <a:scrgbClr r="0" g="0" b="0"/>
+        </a:lnRef>
+        <a:fillRef idx="1">
+          <a:scrgbClr r="0" g="0" b="0"/>
+        </a:fillRef>
+        <a:effectRef idx="0">
+          <a:scrgbClr r="0" g="0" b="0"/>
+        </a:effectRef>
+        <a:fontRef idx="minor">
+          <a:schemeClr val="lt1"/>
+        </a:fontRef>
+      </dsp:style>
+      <dsp:txBody>
+        <a:bodyPr spcFirstLastPara="0" vert="horz" wrap="square" lIns="57150" tIns="57150" rIns="57150" bIns="57150" numCol="1" spcCol="1270" anchor="ctr" anchorCtr="0">
+          <a:noAutofit/>
+        </a:bodyPr>
+        <a:lstStyle/>
+        <a:p>
+          <a:pPr marL="0" lvl="0" indent="0" algn="ctr" defTabSz="666750">
+            <a:lnSpc>
+              <a:spcPct val="90000"/>
+            </a:lnSpc>
+            <a:spcBef>
+              <a:spcPct val="0"/>
+            </a:spcBef>
+            <a:spcAft>
+              <a:spcPct val="35000"/>
+            </a:spcAft>
+            <a:buNone/>
+          </a:pPr>
+          <a:r>
+            <a:rPr lang="en-GB" sz="1500" kern="1200" dirty="0"/>
+            <a:t>Black will be used for the buttons in contrast with the white background</a:t>
+          </a:r>
+          <a:endParaRPr lang="en-US" sz="1500" kern="1200" dirty="0"/>
+        </a:p>
+      </dsp:txBody>
+      <dsp:txXfrm>
+        <a:off x="3115514" y="43269"/>
+        <a:ext cx="2104344" cy="1390790"/>
+      </dsp:txXfrm>
+    </dsp:sp>
+    <dsp:sp modelId="{36CD6E2C-CFD1-4B57-8963-554BC78C1355}">
+      <dsp:nvSpPr>
+        <dsp:cNvPr id="0" name=""/>
+        <dsp:cNvSpPr/>
+      </dsp:nvSpPr>
+      <dsp:spPr>
+        <a:xfrm>
+          <a:off x="5482216" y="466994"/>
+          <a:ext cx="464467" cy="543338"/>
+        </a:xfrm>
+        <a:prstGeom prst="rightArrow">
+          <a:avLst>
+            <a:gd name="adj1" fmla="val 60000"/>
+            <a:gd name="adj2" fmla="val 50000"/>
+          </a:avLst>
+        </a:prstGeom>
+        <a:solidFill>
+          <a:schemeClr val="accent1">
+            <a:tint val="60000"/>
+            <a:hueOff val="0"/>
+            <a:satOff val="0"/>
+            <a:lumOff val="0"/>
+            <a:alphaOff val="0"/>
+          </a:schemeClr>
+        </a:solidFill>
+        <a:ln>
+          <a:noFill/>
+        </a:ln>
+        <a:effectLst/>
+      </dsp:spPr>
+      <dsp:style>
+        <a:lnRef idx="0">
+          <a:scrgbClr r="0" g="0" b="0"/>
+        </a:lnRef>
+        <a:fillRef idx="1">
+          <a:scrgbClr r="0" g="0" b="0"/>
+        </a:fillRef>
+        <a:effectRef idx="0">
+          <a:scrgbClr r="0" g="0" b="0"/>
+        </a:effectRef>
+        <a:fontRef idx="minor">
+          <a:schemeClr val="lt1"/>
+        </a:fontRef>
+      </dsp:style>
+      <dsp:txBody>
+        <a:bodyPr spcFirstLastPara="0" vert="horz" wrap="square" lIns="0" tIns="0" rIns="0" bIns="0" numCol="1" spcCol="1270" anchor="ctr" anchorCtr="0">
+          <a:noAutofit/>
+        </a:bodyPr>
+        <a:lstStyle/>
+        <a:p>
+          <a:pPr marL="0" lvl="0" indent="0" algn="ctr" defTabSz="533400">
+            <a:lnSpc>
+              <a:spcPct val="90000"/>
+            </a:lnSpc>
+            <a:spcBef>
+              <a:spcPct val="0"/>
+            </a:spcBef>
+            <a:spcAft>
+              <a:spcPct val="35000"/>
+            </a:spcAft>
+            <a:buNone/>
+          </a:pPr>
+          <a:endParaRPr lang="en-US" sz="1200" kern="1200"/>
+        </a:p>
+      </dsp:txBody>
+      <dsp:txXfrm>
+        <a:off x="5482216" y="575662"/>
+        <a:ext cx="325127" cy="326002"/>
+      </dsp:txXfrm>
+    </dsp:sp>
+    <dsp:sp modelId="{1A193D5F-240E-4526-AF71-8E0A5EFBB6DA}">
+      <dsp:nvSpPr>
+        <dsp:cNvPr id="0" name=""/>
+        <dsp:cNvSpPr/>
+      </dsp:nvSpPr>
+      <dsp:spPr>
+        <a:xfrm>
+          <a:off x="6139480" y="0"/>
+          <a:ext cx="2190882" cy="1477328"/>
+        </a:xfrm>
+        <a:prstGeom prst="roundRect">
+          <a:avLst>
+            <a:gd name="adj" fmla="val 10000"/>
+          </a:avLst>
+        </a:prstGeom>
+        <a:solidFill>
+          <a:schemeClr val="accent1">
+            <a:hueOff val="0"/>
+            <a:satOff val="0"/>
+            <a:lumOff val="0"/>
+            <a:alphaOff val="0"/>
+          </a:schemeClr>
+        </a:solidFill>
+        <a:ln w="19050" cap="flat" cmpd="sng" algn="ctr">
+          <a:solidFill>
+            <a:schemeClr val="lt1">
+              <a:hueOff val="0"/>
+              <a:satOff val="0"/>
+              <a:lumOff val="0"/>
+              <a:alphaOff val="0"/>
+            </a:schemeClr>
+          </a:solidFill>
+          <a:prstDash val="solid"/>
+          <a:miter lim="800000"/>
+        </a:ln>
+        <a:effectLst/>
+      </dsp:spPr>
+      <dsp:style>
+        <a:lnRef idx="2">
+          <a:scrgbClr r="0" g="0" b="0"/>
+        </a:lnRef>
+        <a:fillRef idx="1">
+          <a:scrgbClr r="0" g="0" b="0"/>
+        </a:fillRef>
+        <a:effectRef idx="0">
+          <a:scrgbClr r="0" g="0" b="0"/>
+        </a:effectRef>
+        <a:fontRef idx="minor">
+          <a:schemeClr val="lt1"/>
+        </a:fontRef>
+      </dsp:style>
+      <dsp:txBody>
+        <a:bodyPr spcFirstLastPara="0" vert="horz" wrap="square" lIns="57150" tIns="57150" rIns="57150" bIns="57150" numCol="1" spcCol="1270" anchor="ctr" anchorCtr="0">
+          <a:noAutofit/>
+        </a:bodyPr>
+        <a:lstStyle/>
+        <a:p>
+          <a:pPr marL="0" lvl="0" indent="0" algn="ctr" defTabSz="666750">
+            <a:lnSpc>
+              <a:spcPct val="90000"/>
+            </a:lnSpc>
+            <a:spcBef>
+              <a:spcPct val="0"/>
+            </a:spcBef>
+            <a:spcAft>
+              <a:spcPct val="35000"/>
+            </a:spcAft>
+            <a:buNone/>
+          </a:pPr>
+          <a:r>
+            <a:rPr lang="en-GB" sz="1500" kern="1200" dirty="0"/>
+            <a:t>Yellow will be used to contrast to the black button to highlight the user is over a button</a:t>
+          </a:r>
+          <a:endParaRPr lang="en-US" sz="1500" kern="1200" dirty="0"/>
+        </a:p>
+      </dsp:txBody>
+      <dsp:txXfrm>
+        <a:off x="6182749" y="43269"/>
+        <a:ext cx="2104344" cy="1390790"/>
+      </dsp:txXfrm>
+    </dsp:sp>
+    <dsp:sp modelId="{41853145-FE48-4A27-A2E2-6D70B4109A98}">
+      <dsp:nvSpPr>
+        <dsp:cNvPr id="0" name=""/>
+        <dsp:cNvSpPr/>
+      </dsp:nvSpPr>
+      <dsp:spPr>
+        <a:xfrm>
+          <a:off x="8549451" y="466994"/>
+          <a:ext cx="464467" cy="543338"/>
+        </a:xfrm>
+        <a:prstGeom prst="rightArrow">
+          <a:avLst>
+            <a:gd name="adj1" fmla="val 60000"/>
+            <a:gd name="adj2" fmla="val 50000"/>
+          </a:avLst>
+        </a:prstGeom>
+        <a:solidFill>
+          <a:schemeClr val="accent1">
+            <a:tint val="60000"/>
+            <a:hueOff val="0"/>
+            <a:satOff val="0"/>
+            <a:lumOff val="0"/>
+            <a:alphaOff val="0"/>
+          </a:schemeClr>
+        </a:solidFill>
+        <a:ln>
+          <a:noFill/>
+        </a:ln>
+        <a:effectLst/>
+      </dsp:spPr>
+      <dsp:style>
+        <a:lnRef idx="0">
+          <a:scrgbClr r="0" g="0" b="0"/>
+        </a:lnRef>
+        <a:fillRef idx="1">
+          <a:scrgbClr r="0" g="0" b="0"/>
+        </a:fillRef>
+        <a:effectRef idx="0">
+          <a:scrgbClr r="0" g="0" b="0"/>
+        </a:effectRef>
+        <a:fontRef idx="minor">
+          <a:schemeClr val="lt1"/>
+        </a:fontRef>
+      </dsp:style>
+      <dsp:txBody>
+        <a:bodyPr spcFirstLastPara="0" vert="horz" wrap="square" lIns="0" tIns="0" rIns="0" bIns="0" numCol="1" spcCol="1270" anchor="ctr" anchorCtr="0">
+          <a:noAutofit/>
+        </a:bodyPr>
+        <a:lstStyle/>
+        <a:p>
+          <a:pPr marL="0" lvl="0" indent="0" algn="ctr" defTabSz="533400">
+            <a:lnSpc>
+              <a:spcPct val="90000"/>
+            </a:lnSpc>
+            <a:spcBef>
+              <a:spcPct val="0"/>
+            </a:spcBef>
+            <a:spcAft>
+              <a:spcPct val="35000"/>
+            </a:spcAft>
+            <a:buNone/>
+          </a:pPr>
+          <a:endParaRPr lang="en-US" sz="1200" kern="1200"/>
+        </a:p>
+      </dsp:txBody>
+      <dsp:txXfrm>
+        <a:off x="8549451" y="575662"/>
+        <a:ext cx="325127" cy="326002"/>
+      </dsp:txXfrm>
+    </dsp:sp>
+    <dsp:sp modelId="{8453ADD8-A0DA-446D-ACBB-698D758B4FC3}">
+      <dsp:nvSpPr>
+        <dsp:cNvPr id="0" name=""/>
+        <dsp:cNvSpPr/>
+      </dsp:nvSpPr>
+      <dsp:spPr>
+        <a:xfrm>
+          <a:off x="9206715" y="0"/>
+          <a:ext cx="2190882" cy="1477328"/>
+        </a:xfrm>
+        <a:prstGeom prst="roundRect">
+          <a:avLst>
+            <a:gd name="adj" fmla="val 10000"/>
+          </a:avLst>
+        </a:prstGeom>
+        <a:solidFill>
+          <a:schemeClr val="accent1">
+            <a:hueOff val="0"/>
+            <a:satOff val="0"/>
+            <a:lumOff val="0"/>
+            <a:alphaOff val="0"/>
+          </a:schemeClr>
+        </a:solidFill>
+        <a:ln w="19050" cap="flat" cmpd="sng" algn="ctr">
+          <a:solidFill>
+            <a:schemeClr val="lt1">
+              <a:hueOff val="0"/>
+              <a:satOff val="0"/>
+              <a:lumOff val="0"/>
+              <a:alphaOff val="0"/>
+            </a:schemeClr>
+          </a:solidFill>
+          <a:prstDash val="solid"/>
+          <a:miter lim="800000"/>
+        </a:ln>
+        <a:effectLst/>
+      </dsp:spPr>
+      <dsp:style>
+        <a:lnRef idx="2">
+          <a:scrgbClr r="0" g="0" b="0"/>
+        </a:lnRef>
+        <a:fillRef idx="1">
+          <a:scrgbClr r="0" g="0" b="0"/>
+        </a:fillRef>
+        <a:effectRef idx="0">
+          <a:scrgbClr r="0" g="0" b="0"/>
+        </a:effectRef>
+        <a:fontRef idx="minor">
+          <a:schemeClr val="lt1"/>
+        </a:fontRef>
+      </dsp:style>
+      <dsp:txBody>
+        <a:bodyPr spcFirstLastPara="0" vert="horz" wrap="square" lIns="57150" tIns="57150" rIns="57150" bIns="57150" numCol="1" spcCol="1270" anchor="ctr" anchorCtr="0">
+          <a:noAutofit/>
+        </a:bodyPr>
+        <a:lstStyle/>
+        <a:p>
+          <a:pPr marL="0" lvl="0" indent="0" algn="ctr" defTabSz="666750">
+            <a:lnSpc>
+              <a:spcPct val="90000"/>
+            </a:lnSpc>
+            <a:spcBef>
+              <a:spcPct val="0"/>
+            </a:spcBef>
+            <a:spcAft>
+              <a:spcPct val="35000"/>
+            </a:spcAft>
+            <a:buNone/>
+          </a:pPr>
+          <a:r>
+            <a:rPr lang="en-GB" sz="1500" kern="1200" dirty="0"/>
+            <a:t>Green will be used for the buttons to complete forms and anything that may be processed (log in button, form completed button, etc)</a:t>
+          </a:r>
+          <a:endParaRPr lang="en-US" sz="1500" kern="1200" dirty="0"/>
+        </a:p>
+      </dsp:txBody>
+      <dsp:txXfrm>
+        <a:off x="9249984" y="43269"/>
+        <a:ext cx="2104344" cy="1390790"/>
+      </dsp:txXfrm>
+    </dsp:sp>
+  </dsp:spTree>
+</dsp:drawing>
+</file>
+
+<file path=ppt/diagrams/layout1.xml><?xml version="1.0" encoding="utf-8"?>
+<dgm:layoutDef xmlns:dgm="http://schemas.openxmlformats.org/drawingml/2006/diagram" xmlns:a="http://schemas.openxmlformats.org/drawingml/2006/main" uniqueId="urn:microsoft.com/office/officeart/2005/8/layout/process1">
+  <dgm:title val=""/>
+  <dgm:desc val=""/>
+  <dgm:catLst>
+    <dgm:cat type="process" pri="1000"/>
+    <dgm:cat type="convert" pri="15000"/>
+  </dgm:catLst>
+  <dgm:sampData useDef="1">
+    <dgm:dataModel>
+      <dgm:ptLst/>
+      <dgm:bg/>
+      <dgm:whole/>
+    </dgm:dataModel>
+  </dgm:sampData>
+  <dgm:styleData>
+    <dgm:dataModel>
+      <dgm:ptLst>
+        <dgm:pt modelId="0" type="doc"/>
+        <dgm:pt modelId="1"/>
+        <dgm:pt modelId="2"/>
+      </dgm:ptLst>
+      <dgm:cxnLst>
+        <dgm:cxn modelId="3" srcId="0" destId="1" srcOrd="0" destOrd="0"/>
+        <dgm:cxn modelId="4" srcId="0" destId="2" srcOrd="1" destOrd="0"/>
+      </dgm:cxnLst>
+      <dgm:bg/>
+      <dgm:whole/>
+    </dgm:dataModel>
+  </dgm:styleData>
+  <dgm:clrData>
+    <dgm:dataModel>
+      <dgm:ptLst>
+        <dgm:pt modelId="0" type="doc"/>
+        <dgm:pt modelId="1"/>
+        <dgm:pt modelId="2"/>
+        <dgm:pt modelId="3"/>
+        <dgm:pt modelId="4"/>
+      </dgm:ptLst>
+      <dgm:cxnLst>
+        <dgm:cxn modelId="5" srcId="0" destId="1" srcOrd="0" destOrd="0"/>
+        <dgm:cxn modelId="6" srcId="0" destId="2" srcOrd="1" destOrd="0"/>
+        <dgm:cxn modelId="7" srcId="0" destId="3" srcOrd="2" destOrd="0"/>
+        <dgm:cxn modelId="8" srcId="0" destId="4" srcOrd="3" destOrd="0"/>
+      </dgm:cxnLst>
+      <dgm:bg/>
+      <dgm:whole/>
+    </dgm:dataModel>
+  </dgm:clrData>
+  <dgm:layoutNode name="Name0">
+    <dgm:varLst>
+      <dgm:dir/>
+      <dgm:resizeHandles val="exact"/>
+    </dgm:varLst>
+    <dgm:choose name="Name1">
+      <dgm:if name="Name2" func="var" arg="dir" op="equ" val="norm">
+        <dgm:alg type="lin"/>
+      </dgm:if>
+      <dgm:else name="Name3">
+        <dgm:alg type="lin">
+          <dgm:param type="linDir" val="fromR"/>
+        </dgm:alg>
+      </dgm:else>
+    </dgm:choose>
+    <dgm:shape xmlns:r="http://schemas.openxmlformats.org/officeDocument/2006/relationships" r:blip="">
+      <dgm:adjLst/>
+    </dgm:shape>
+    <dgm:presOf/>
+    <dgm:constrLst>
+      <dgm:constr type="w" for="ch" ptType="node" refType="w"/>
+      <dgm:constr type="h" for="ch" ptType="node" op="equ"/>
+      <dgm:constr type="primFontSz" for="ch" ptType="node" op="equ" val="65"/>
+      <dgm:constr type="w" for="ch" ptType="sibTrans" refType="w" refFor="ch" refPtType="node" op="equ" fact="0.4"/>
+      <dgm:constr type="h" for="ch" ptType="sibTrans" op="equ"/>
+      <dgm:constr type="primFontSz" for="des" forName="connectorText" op="equ" val="55"/>
+      <dgm:constr type="primFontSz" for="des" forName="connectorText" refType="primFontSz" refFor="ch" refPtType="node" op="lte" fact="0.8"/>
+    </dgm:constrLst>
+    <dgm:ruleLst/>
+    <dgm:forEach name="nodesForEach" axis="ch" ptType="node">
+      <dgm:layoutNode name="node">
+        <dgm:varLst>
+          <dgm:bulletEnabled val="1"/>
+        </dgm:varLst>
+        <dgm:alg type="tx"/>
+        <dgm:shape xmlns:r="http://schemas.openxmlformats.org/officeDocument/2006/relationships" type="roundRect" r:blip="">
+          <dgm:adjLst>
+            <dgm:adj idx="1" val="0.1"/>
+          </dgm:adjLst>
+        </dgm:shape>
+        <dgm:presOf axis="desOrSelf" ptType="node"/>
+        <dgm:constrLst>
+          <dgm:constr type="h" refType="w" fact="0.6"/>
+          <dgm:constr type="tMarg" refType="primFontSz" fact="0.3"/>
+          <dgm:constr type="bMarg" refType="primFontSz" fact="0.3"/>
+          <dgm:constr type="lMarg" refType="primFontSz" fact="0.3"/>
+          <dgm:constr type="rMarg" refType="primFontSz" fact="0.3"/>
+        </dgm:constrLst>
+        <dgm:ruleLst>
+          <dgm:rule type="primFontSz" val="18" fact="NaN" max="NaN"/>
+          <dgm:rule type="h" val="NaN" fact="1.5" max="NaN"/>
+          <dgm:rule type="primFontSz" val="5" fact="NaN" max="NaN"/>
+          <dgm:rule type="h" val="INF" fact="NaN" max="NaN"/>
+        </dgm:ruleLst>
+      </dgm:layoutNode>
+      <dgm:forEach name="sibTransForEach" axis="followSib" ptType="sibTrans" cnt="1">
+        <dgm:layoutNode name="sibTrans">
+          <dgm:alg type="conn">
+            <dgm:param type="begPts" val="auto"/>
+            <dgm:param type="endPts" val="auto"/>
+          </dgm:alg>
+          <dgm:shape xmlns:r="http://schemas.openxmlformats.org/officeDocument/2006/relationships" type="conn" r:blip="">
+            <dgm:adjLst/>
+          </dgm:shape>
+          <dgm:presOf axis="self"/>
+          <dgm:constrLst>
+            <dgm:constr type="h" refType="w" fact="0.62"/>
+            <dgm:constr type="connDist"/>
+            <dgm:constr type="begPad" refType="connDist" fact="0.25"/>
+            <dgm:constr type="endPad" refType="connDist" fact="0.22"/>
+          </dgm:constrLst>
+          <dgm:ruleLst/>
+          <dgm:layoutNode name="connectorText">
+            <dgm:alg type="tx">
+              <dgm:param type="autoTxRot" val="grav"/>
+            </dgm:alg>
+            <dgm:shape xmlns:r="http://schemas.openxmlformats.org/officeDocument/2006/relationships" type="conn" r:blip="" hideGeom="1">
+              <dgm:adjLst/>
+            </dgm:shape>
+            <dgm:presOf axis="self"/>
+            <dgm:constrLst>
+              <dgm:constr type="lMarg"/>
+              <dgm:constr type="rMarg"/>
+              <dgm:constr type="tMarg"/>
+              <dgm:constr type="bMarg"/>
+            </dgm:constrLst>
+            <dgm:ruleLst>
+              <dgm:rule type="primFontSz" val="5" fact="NaN" max="NaN"/>
+            </dgm:ruleLst>
+          </dgm:layoutNode>
+        </dgm:layoutNode>
+      </dgm:forEach>
+    </dgm:forEach>
+  </dgm:layoutNode>
+</dgm:layoutDef>
+</file>
+
+<file path=ppt/diagrams/quickStyle1.xml><?xml version="1.0" encoding="utf-8"?>
+<dgm:styleDef xmlns:dgm="http://schemas.openxmlformats.org/drawingml/2006/diagram" xmlns:a="http://schemas.openxmlformats.org/drawingml/2006/main" uniqueId="urn:microsoft.com/office/officeart/2005/8/quickstyle/simple1">
+  <dgm:title val=""/>
+  <dgm:desc val=""/>
+  <dgm:catLst>
+    <dgm:cat type="simple" pri="10100"/>
+  </dgm:catLst>
+  <dgm:scene3d>
+    <a:camera prst="orthographicFront"/>
+    <a:lightRig rig="threePt" dir="t"/>
+  </dgm:scene3d>
+  <dgm:styleLbl name="node0">
+    <dgm:scene3d>
+      <a:camera prst="orthographicFront"/>
+      <a:lightRig rig="threePt" dir="t"/>
+    </dgm:scene3d>
+    <dgm:sp3d/>
+    <dgm:txPr/>
+    <dgm:style>
+      <a:lnRef idx="2">
+        <a:scrgbClr r="0" g="0" b="0"/>
+      </a:lnRef>
+      <a:fillRef idx="1">
+        <a:scrgbClr r="0" g="0" b="0"/>
+      </a:fillRef>
+      <a:effectRef idx="0">
+        <a:scrgbClr r="0" g="0" b="0"/>
+      </a:effectRef>
+      <a:fontRef idx="minor">
+        <a:schemeClr val="lt1"/>
+      </a:fontRef>
+    </dgm:style>
+  </dgm:styleLbl>
+  <dgm:styleLbl name="lnNode1">
+    <dgm:scene3d>
+      <a:camera prst="orthographicFront"/>
+      <a:lightRig rig="threePt" dir="t"/>
+    </dgm:scene3d>
+    <dgm:sp3d/>
+    <dgm:txPr/>
+    <dgm:style>
+      <a:lnRef idx="2">
+        <a:scrgbClr r="0" g="0" b="0"/>
+      </a:lnRef>
+      <a:fillRef idx="1">
+        <a:scrgbClr r="0" g="0" b="0"/>
+      </a:fillRef>
+      <a:effectRef idx="0">
+        <a:scrgbClr r="0" g="0" b="0"/>
+      </a:effectRef>
+      <a:fontRef idx="minor">
+        <a:schemeClr val="lt1"/>
+      </a:fontRef>
+    </dgm:style>
+  </dgm:styleLbl>
+  <dgm:styleLbl name="vennNode1">
+    <dgm:scene3d>
+      <a:camera prst="orthographicFront"/>
+      <a:lightRig rig="threePt" dir="t"/>
+    </dgm:scene3d>
+    <dgm:sp3d/>
+    <dgm:txPr/>
+    <dgm:style>
+      <a:lnRef idx="2">
+        <a:scrgbClr r="0" g="0" b="0"/>
+      </a:lnRef>
+      <a:fillRef idx="1">
+        <a:scrgbClr r="0" g="0" b="0"/>
+      </a:fillRef>
+      <a:effectRef idx="0">
+        <a:scrgbClr r="0" g="0" b="0"/>
+      </a:effectRef>
+      <a:fontRef idx="minor">
+        <a:schemeClr val="tx1"/>
+      </a:fontRef>
+    </dgm:style>
+  </dgm:styleLbl>
+  <dgm:styleLbl name="alignNode1">
+    <dgm:scene3d>
+      <a:camera prst="orthographicFront"/>
+      <a:lightRig rig="threePt" dir="t"/>
+    </dgm:scene3d>
+    <dgm:sp3d/>
+    <dgm:txPr/>
+    <dgm:style>
+      <a:lnRef idx="2">
+        <a:scrgbClr r="0" g="0" b="0"/>
+      </a:lnRef>
+      <a:fillRef idx="1">
+        <a:scrgbClr r="0" g="0" b="0"/>
+      </a:fillRef>
+      <a:effectRef idx="0">
+        <a:scrgbClr r="0" g="0" b="0"/>
+      </a:effectRef>
+      <a:fontRef idx="minor">
+        <a:schemeClr val="lt1"/>
+      </a:fontRef>
+    </dgm:style>
+  </dgm:styleLbl>
+  <dgm:styleLbl name="node1">
+    <dgm:scene3d>
+      <a:camera prst="orthographicFront"/>
+      <a:lightRig rig="threePt" dir="t"/>
+    </dgm:scene3d>
+    <dgm:sp3d/>
+    <dgm:txPr/>
+    <dgm:style>
+      <a:lnRef idx="2">
+        <a:scrgbClr r="0" g="0" b="0"/>
+      </a:lnRef>
+      <a:fillRef idx="1">
+        <a:scrgbClr r="0" g="0" b="0"/>
+      </a:fillRef>
+      <a:effectRef idx="0">
+        <a:scrgbClr r="0" g="0" b="0"/>
+      </a:effectRef>
+      <a:fontRef idx="minor">
+        <a:schemeClr val="lt1"/>
+      </a:fontRef>
+    </dgm:style>
+  </dgm:styleLbl>
+  <dgm:styleLbl name="node2">
+    <dgm:scene3d>
+      <a:camera prst="orthographicFront"/>
+      <a:lightRig rig="threePt" dir="t"/>
+    </dgm:scene3d>
+    <dgm:sp3d/>
+    <dgm:txPr/>
+    <dgm:style>
+      <a:lnRef idx="2">
+        <a:scrgbClr r="0" g="0" b="0"/>
+      </a:lnRef>
+      <a:fillRef idx="1">
+        <a:scrgbClr r="0" g="0" b="0"/>
+      </a:fillRef>
+      <a:effectRef idx="0">
+        <a:scrgbClr r="0" g="0" b="0"/>
+      </a:effectRef>
+      <a:fontRef idx="minor">
+        <a:schemeClr val="lt1"/>
+      </a:fontRef>
+    </dgm:style>
+  </dgm:styleLbl>
+  <dgm:styleLbl name="node3">
+    <dgm:scene3d>
+      <a:camera prst="orthographicFront"/>
+      <a:lightRig rig="threePt" dir="t"/>
+    </dgm:scene3d>
+    <dgm:sp3d/>
+    <dgm:txPr/>
+    <dgm:style>
+      <a:lnRef idx="2">
+        <a:scrgbClr r="0" g="0" b="0"/>
+      </a:lnRef>
+      <a:fillRef idx="1">
+        <a:scrgbClr r="0" g="0" b="0"/>
+      </a:fillRef>
+      <a:effectRef idx="0">
+        <a:scrgbClr r="0" g="0" b="0"/>
+      </a:effectRef>
+      <a:fontRef idx="minor">
+        <a:schemeClr val="lt1"/>
+      </a:fontRef>
+    </dgm:style>
+  </dgm:styleLbl>
+  <dgm:styleLbl name="node4">
+    <dgm:scene3d>
+      <a:camera prst="orthographicFront"/>
+      <a:lightRig rig="threePt" dir="t"/>
+    </dgm:scene3d>
+    <dgm:sp3d/>
+    <dgm:txPr/>
+    <dgm:style>
+      <a:lnRef idx="2">
+        <a:scrgbClr r="0" g="0" b="0"/>
+      </a:lnRef>
+      <a:fillRef idx="1">
+        <a:scrgbClr r="0" g="0" b="0"/>
+      </a:fillRef>
+      <a:effectRef idx="0">
+        <a:scrgbClr r="0" g="0" b="0"/>
+      </a:effectRef>
+      <a:fontRef idx="minor">
+        <a:schemeClr val="lt1"/>
+      </a:fontRef>
+    </dgm:style>
+  </dgm:styleLbl>
+  <dgm:styleLbl name="fgImgPlace1">
+    <dgm:scene3d>
+      <a:camera prst="orthographicFront"/>
+      <a:lightRig rig="threePt" dir="t"/>
+    </dgm:scene3d>
+    <dgm:sp3d/>
+    <dgm:txPr/>
+    <dgm:style>
+      <a:lnRef idx="2">
+        <a:scrgbClr r="0" g="0" b="0"/>
+      </a:lnRef>
+      <a:fillRef idx="1">
+        <a:scrgbClr r="0" g="0" b="0"/>
+      </a:fillRef>
+      <a:effectRef idx="0">
+        <a:scrgbClr r="0" g="0" b="0"/>
+      </a:effectRef>
+      <a:fontRef idx="minor"/>
+    </dgm:style>
+  </dgm:styleLbl>
+  <dgm:styleLbl name="alignImgPlace1">
+    <dgm:scene3d>
+      <a:camera prst="orthographicFront"/>
+      <a:lightRig rig="threePt" dir="t"/>
+    </dgm:scene3d>
+    <dgm:sp3d/>
+    <dgm:txPr/>
+    <dgm:style>
+      <a:lnRef idx="2">
+        <a:scrgbClr r="0" g="0" b="0"/>
+      </a:lnRef>
+      <a:fillRef idx="1">
+        <a:scrgbClr r="0" g="0" b="0"/>
+      </a:fillRef>
+      <a:effectRef idx="0">
+        <a:scrgbClr r="0" g="0" b="0"/>
+      </a:effectRef>
+      <a:fontRef idx="minor"/>
+    </dgm:style>
+  </dgm:styleLbl>
+  <dgm:styleLbl name="bgImgPlace1">
+    <dgm:scene3d>
+      <a:camera prst="orthographicFront"/>
+      <a:lightRig rig="threePt" dir="t"/>
+    </dgm:scene3d>
+    <dgm:sp3d/>
+    <dgm:txPr/>
+    <dgm:style>
+      <a:lnRef idx="2">
+        <a:scrgbClr r="0" g="0" b="0"/>
+      </a:lnRef>
+      <a:fillRef idx="1">
+        <a:scrgbClr r="0" g="0" b="0"/>
+      </a:fillRef>
+      <a:effectRef idx="0">
+        <a:scrgbClr r="0" g="0" b="0"/>
+      </a:effectRef>
+      <a:fontRef idx="minor"/>
+    </dgm:style>
+  </dgm:styleLbl>
+  <dgm:styleLbl name="sibTrans2D1">
+    <dgm:scene3d>
+      <a:camera prst="orthographicFront"/>
+      <a:lightRig rig="threePt" dir="t"/>
+    </dgm:scene3d>
+    <dgm:sp3d/>
+    <dgm:txPr/>
+    <dgm:style>
+      <a:lnRef idx="0">
+        <a:scrgbClr r="0" g="0" b="0"/>
+      </a:lnRef>
+      <a:fillRef idx="1">
+        <a:scrgbClr r="0" g="0" b="0"/>
+      </a:fillRef>
+      <a:effectRef idx="0">
+        <a:scrgbClr r="0" g="0" b="0"/>
+      </a:effectRef>
+      <a:fontRef idx="minor">
+        <a:schemeClr val="lt1"/>
+      </a:fontRef>
+    </dgm:style>
+  </dgm:styleLbl>
+  <dgm:styleLbl name="fgSibTrans2D1">
+    <dgm:scene3d>
+      <a:camera prst="orthographicFront"/>
+      <a:lightRig rig="threePt" dir="t"/>
+    </dgm:scene3d>
+    <dgm:sp3d/>
+    <dgm:txPr/>
+    <dgm:style>
+      <a:lnRef idx="0">
+        <a:scrgbClr r="0" g="0" b="0"/>
+      </a:lnRef>
+      <a:fillRef idx="1">
+        <a:scrgbClr r="0" g="0" b="0"/>
+      </a:fillRef>
+      <a:effectRef idx="0">
+        <a:scrgbClr r="0" g="0" b="0"/>
+      </a:effectRef>
+      <a:fontRef idx="minor">
+        <a:schemeClr val="lt1"/>
+      </a:fontRef>
+    </dgm:style>
+  </dgm:styleLbl>
+  <dgm:styleLbl name="bgSibTrans2D1">
+    <dgm:scene3d>
+      <a:camera prst="orthographicFront"/>
+      <a:lightRig rig="threePt" dir="t"/>
+    </dgm:scene3d>
+    <dgm:sp3d/>
+    <dgm:txPr/>
+    <dgm:style>
+      <a:lnRef idx="0">
+        <a:scrgbClr r="0" g="0" b="0"/>
+      </a:lnRef>
+      <a:fillRef idx="1">
+        <a:scrgbClr r="0" g="0" b="0"/>
+      </a:fillRef>
+      <a:effectRef idx="0">
+        <a:scrgbClr r="0" g="0" b="0"/>
+      </a:effectRef>
+      <a:fontRef idx="minor">
+        <a:schemeClr val="lt1"/>
+      </a:fontRef>
+    </dgm:style>
+  </dgm:styleLbl>
+  <dgm:styleLbl name="sibTrans1D1">
+    <dgm:scene3d>
+      <a:camera prst="orthographicFront"/>
+      <a:lightRig rig="threePt" dir="t"/>
+    </dgm:scene3d>
+    <dgm:sp3d/>
+    <dgm:txPr/>
+    <dgm:style>
+      <a:lnRef idx="1">
+        <a:scrgbClr r="0" g="0" b="0"/>
+      </a:lnRef>
+      <a:fillRef idx="0">
+        <a:scrgbClr r="0" g="0" b="0"/>
+      </a:fillRef>
+      <a:effectRef idx="0">
+        <a:scrgbClr r="0" g="0" b="0"/>
+      </a:effectRef>
+      <a:fontRef idx="minor"/>
+    </dgm:style>
+  </dgm:styleLbl>
+  <dgm:styleLbl name="callout">
+    <dgm:scene3d>
+      <a:camera prst="orthographicFront"/>
+      <a:lightRig rig="threePt" dir="t"/>
+    </dgm:scene3d>
+    <dgm:sp3d/>
+    <dgm:txPr/>
+    <dgm:style>
+      <a:lnRef idx="2">
+        <a:scrgbClr r="0" g="0" b="0"/>
+      </a:lnRef>
+      <a:fillRef idx="1">
+        <a:scrgbClr r="0" g="0" b="0"/>
+      </a:fillRef>
+      <a:effectRef idx="0">
+        <a:scrgbClr r="0" g="0" b="0"/>
+      </a:effectRef>
+      <a:fontRef idx="minor"/>
+    </dgm:style>
+  </dgm:styleLbl>
+  <dgm:styleLbl name="asst0">
+    <dgm:scene3d>
+      <a:camera prst="orthographicFront"/>
+      <a:lightRig rig="threePt" dir="t"/>
+    </dgm:scene3d>
+    <dgm:sp3d/>
+    <dgm:txPr/>
+    <dgm:style>
+      <a:lnRef idx="2">
+        <a:scrgbClr r="0" g="0" b="0"/>
+      </a:lnRef>
+      <a:fillRef idx="1">
+        <a:scrgbClr r="0" g="0" b="0"/>
+      </a:fillRef>
+      <a:effectRef idx="0">
+        <a:scrgbClr r="0" g="0" b="0"/>
+      </a:effectRef>
+      <a:fontRef idx="minor">
+        <a:schemeClr val="lt1"/>
+      </a:fontRef>
+    </dgm:style>
+  </dgm:styleLbl>
+  <dgm:styleLbl name="asst1">
+    <dgm:scene3d>
+      <a:camera prst="orthographicFront"/>
+      <a:lightRig rig="threePt" dir="t"/>
+    </dgm:scene3d>
+    <dgm:sp3d/>
+    <dgm:txPr/>
+    <dgm:style>
+      <a:lnRef idx="2">
+        <a:scrgbClr r="0" g="0" b="0"/>
+      </a:lnRef>
+      <a:fillRef idx="1">
+        <a:scrgbClr r="0" g="0" b="0"/>
+      </a:fillRef>
+      <a:effectRef idx="0">
+        <a:scrgbClr r="0" g="0" b="0"/>
+      </a:effectRef>
+      <a:fontRef idx="minor">
+        <a:schemeClr val="lt1"/>
+      </a:fontRef>
+    </dgm:style>
+  </dgm:styleLbl>
+  <dgm:styleLbl name="asst2">
+    <dgm:scene3d>
+      <a:camera prst="orthographicFront"/>
+      <a:lightRig rig="threePt" dir="t"/>
+    </dgm:scene3d>
+    <dgm:sp3d/>
+    <dgm:txPr/>
+    <dgm:style>
+      <a:lnRef idx="2">
+        <a:scrgbClr r="0" g="0" b="0"/>
+      </a:lnRef>
+      <a:fillRef idx="1">
+        <a:scrgbClr r="0" g="0" b="0"/>
+      </a:fillRef>
+      <a:effectRef idx="0">
+        <a:scrgbClr r="0" g="0" b="0"/>
+      </a:effectRef>
+      <a:fontRef idx="minor">
+        <a:schemeClr val="lt1"/>
+      </a:fontRef>
+    </dgm:style>
+  </dgm:styleLbl>
+  <dgm:styleLbl name="asst3">
+    <dgm:scene3d>
+      <a:camera prst="orthographicFront"/>
+      <a:lightRig rig="threePt" dir="t"/>
+    </dgm:scene3d>
+    <dgm:sp3d/>
+    <dgm:txPr/>
+    <dgm:style>
+      <a:lnRef idx="2">
+        <a:scrgbClr r="0" g="0" b="0"/>
+      </a:lnRef>
+      <a:fillRef idx="1">
+        <a:scrgbClr r="0" g="0" b="0"/>
+      </a:fillRef>
+      <a:effectRef idx="0">
+        <a:scrgbClr r="0" g="0" b="0"/>
+      </a:effectRef>
+      <a:fontRef idx="minor">
+        <a:schemeClr val="lt1"/>
+      </a:fontRef>
+    </dgm:style>
+  </dgm:styleLbl>
+  <dgm:styleLbl name="asst4">
+    <dgm:scene3d>
+      <a:camera prst="orthographicFront"/>
+      <a:lightRig rig="threePt" dir="t"/>
+    </dgm:scene3d>
+    <dgm:sp3d/>
+    <dgm:txPr/>
+    <dgm:style>
+      <a:lnRef idx="2">
+        <a:scrgbClr r="0" g="0" b="0"/>
+      </a:lnRef>
+      <a:fillRef idx="1">
+        <a:scrgbClr r="0" g="0" b="0"/>
+      </a:fillRef>
+      <a:effectRef idx="0">
+        <a:scrgbClr r="0" g="0" b="0"/>
+      </a:effectRef>
+      <a:fontRef idx="minor">
+        <a:schemeClr val="lt1"/>
+      </a:fontRef>
+    </dgm:style>
+  </dgm:styleLbl>
+  <dgm:styleLbl name="parChTrans2D1">
+    <dgm:scene3d>
+      <a:camera prst="orthographicFront"/>
+      <a:lightRig rig="threePt" dir="t"/>
+    </dgm:scene3d>
+    <dgm:sp3d/>
+    <dgm:txPr/>
+    <dgm:style>
+      <a:lnRef idx="2">
+        <a:scrgbClr r="0" g="0" b="0"/>
+      </a:lnRef>
+      <a:fillRef idx="1">
+        <a:scrgbClr r="0" g="0" b="0"/>
+      </a:fillRef>
+      <a:effectRef idx="0">
+        <a:scrgbClr r="0" g="0" b="0"/>
+      </a:effectRef>
+      <a:fontRef idx="minor">
+        <a:schemeClr val="lt1"/>
+      </a:fontRef>
+    </dgm:style>
+  </dgm:styleLbl>
+  <dgm:styleLbl name="parChTrans2D2">
+    <dgm:scene3d>
+      <a:camera prst="orthographicFront"/>
+      <a:lightRig rig="threePt" dir="t"/>
+    </dgm:scene3d>
+    <dgm:sp3d/>
+    <dgm:txPr/>
+    <dgm:style>
+      <a:lnRef idx="2">
+        <a:scrgbClr r="0" g="0" b="0"/>
+      </a:lnRef>
+      <a:fillRef idx="1">
+        <a:scrgbClr r="0" g="0" b="0"/>
+      </a:fillRef>
+      <a:effectRef idx="0">
+        <a:scrgbClr r="0" g="0" b="0"/>
+      </a:effectRef>
+      <a:fontRef idx="minor">
+        <a:schemeClr val="lt1"/>
+      </a:fontRef>
+    </dgm:style>
+  </dgm:styleLbl>
+  <dgm:styleLbl name="parChTrans2D3">
+    <dgm:scene3d>
+      <a:camera prst="orthographicFront"/>
+      <a:lightRig rig="threePt" dir="t"/>
+    </dgm:scene3d>
+    <dgm:sp3d/>
+    <dgm:txPr/>
+    <dgm:style>
+      <a:lnRef idx="2">
+        <a:scrgbClr r="0" g="0" b="0"/>
+      </a:lnRef>
+      <a:fillRef idx="1">
+        <a:scrgbClr r="0" g="0" b="0"/>
+      </a:fillRef>
+      <a:effectRef idx="0">
+        <a:scrgbClr r="0" g="0" b="0"/>
+      </a:effectRef>
+      <a:fontRef idx="minor">
+        <a:schemeClr val="lt1"/>
+      </a:fontRef>
+    </dgm:style>
+  </dgm:styleLbl>
+  <dgm:styleLbl name="parChTrans2D4">
+    <dgm:scene3d>
+      <a:camera prst="orthographicFront"/>
+      <a:lightRig rig="threePt" dir="t"/>
+    </dgm:scene3d>
+    <dgm:sp3d/>
+    <dgm:txPr/>
+    <dgm:style>
+      <a:lnRef idx="2">
+        <a:scrgbClr r="0" g="0" b="0"/>
+      </a:lnRef>
+      <a:fillRef idx="1">
+        <a:scrgbClr r="0" g="0" b="0"/>
+      </a:fillRef>
+      <a:effectRef idx="0">
+        <a:scrgbClr r="0" g="0" b="0"/>
+      </a:effectRef>
+      <a:fontRef idx="minor">
+        <a:schemeClr val="lt1"/>
+      </a:fontRef>
+    </dgm:style>
+  </dgm:styleLbl>
+  <dgm:styleLbl name="parChTrans1D1">
+    <dgm:scene3d>
+      <a:camera prst="orthographicFront"/>
+      <a:lightRig rig="threePt" dir="t"/>
+    </dgm:scene3d>
+    <dgm:sp3d/>
+    <dgm:txPr/>
+    <dgm:style>
+      <a:lnRef idx="2">
+        <a:scrgbClr r="0" g="0" b="0"/>
+      </a:lnRef>
+      <a:fillRef idx="0">
+        <a:scrgbClr r="0" g="0" b="0"/>
+      </a:fillRef>
+      <a:effectRef idx="0">
+        <a:scrgbClr r="0" g="0" b="0"/>
+      </a:effectRef>
+      <a:fontRef idx="minor"/>
+    </dgm:style>
+  </dgm:styleLbl>
+  <dgm:styleLbl name="parChTrans1D2">
+    <dgm:scene3d>
+      <a:camera prst="orthographicFront"/>
+      <a:lightRig rig="threePt" dir="t"/>
+    </dgm:scene3d>
+    <dgm:sp3d/>
+    <dgm:txPr/>
+    <dgm:style>
+      <a:lnRef idx="2">
+        <a:scrgbClr r="0" g="0" b="0"/>
+      </a:lnRef>
+      <a:fillRef idx="0">
+        <a:scrgbClr r="0" g="0" b="0"/>
+      </a:fillRef>
+      <a:effectRef idx="0">
+        <a:scrgbClr r="0" g="0" b="0"/>
+      </a:effectRef>
+      <a:fontRef idx="minor"/>
+    </dgm:style>
+  </dgm:styleLbl>
+  <dgm:styleLbl name="parChTrans1D3">
+    <dgm:scene3d>
+      <a:camera prst="orthographicFront"/>
+      <a:lightRig rig="threePt" dir="t"/>
+    </dgm:scene3d>
+    <dgm:sp3d/>
+    <dgm:txPr/>
+    <dgm:style>
+      <a:lnRef idx="2">
+        <a:scrgbClr r="0" g="0" b="0"/>
+      </a:lnRef>
+      <a:fillRef idx="0">
+        <a:scrgbClr r="0" g="0" b="0"/>
+      </a:fillRef>
+      <a:effectRef idx="0">
+        <a:scrgbClr r="0" g="0" b="0"/>
+      </a:effectRef>
+      <a:fontRef idx="minor"/>
+    </dgm:style>
+  </dgm:styleLbl>
+  <dgm:styleLbl name="parChTrans1D4">
+    <dgm:scene3d>
+      <a:camera prst="orthographicFront"/>
+      <a:lightRig rig="threePt" dir="t"/>
+    </dgm:scene3d>
+    <dgm:sp3d/>
+    <dgm:txPr/>
+    <dgm:style>
+      <a:lnRef idx="2">
+        <a:scrgbClr r="0" g="0" b="0"/>
+      </a:lnRef>
+      <a:fillRef idx="0">
+        <a:scrgbClr r="0" g="0" b="0"/>
+      </a:fillRef>
+      <a:effectRef idx="0">
+        <a:scrgbClr r="0" g="0" b="0"/>
+      </a:effectRef>
+      <a:fontRef idx="minor"/>
+    </dgm:style>
+  </dgm:styleLbl>
+  <dgm:styleLbl name="fgAcc1">
+    <dgm:scene3d>
+      <a:camera prst="orthographicFront"/>
+      <a:lightRig rig="threePt" dir="t"/>
+    </dgm:scene3d>
+    <dgm:sp3d/>
+    <dgm:txPr/>
+    <dgm:style>
+      <a:lnRef idx="2">
+        <a:scrgbClr r="0" g="0" b="0"/>
+      </a:lnRef>
+      <a:fillRef idx="1">
+        <a:scrgbClr r="0" g="0" b="0"/>
+      </a:fillRef>
+      <a:effectRef idx="0">
+        <a:scrgbClr r="0" g="0" b="0"/>
+      </a:effectRef>
+      <a:fontRef idx="minor"/>
+    </dgm:style>
+  </dgm:styleLbl>
+  <dgm:styleLbl name="conFgAcc1">
+    <dgm:scene3d>
+      <a:camera prst="orthographicFront"/>
+      <a:lightRig rig="threePt" dir="t"/>
+    </dgm:scene3d>
+    <dgm:sp3d/>
+    <dgm:txPr/>
+    <dgm:style>
+      <a:lnRef idx="2">
+        <a:scrgbClr r="0" g="0" b="0"/>
+      </a:lnRef>
+      <a:fillRef idx="1">
+        <a:scrgbClr r="0" g="0" b="0"/>
+      </a:fillRef>
+      <a:effectRef idx="0">
+        <a:scrgbClr r="0" g="0" b="0"/>
+      </a:effectRef>
+      <a:fontRef idx="minor"/>
+    </dgm:style>
+  </dgm:styleLbl>
+  <dgm:styleLbl name="alignAcc1">
+    <dgm:scene3d>
+      <a:camera prst="orthographicFront"/>
+      <a:lightRig rig="threePt" dir="t"/>
+    </dgm:scene3d>
+    <dgm:sp3d/>
+    <dgm:txPr/>
+    <dgm:style>
+      <a:lnRef idx="2">
+        <a:scrgbClr r="0" g="0" b="0"/>
+      </a:lnRef>
+      <a:fillRef idx="1">
+        <a:scrgbClr r="0" g="0" b="0"/>
+      </a:fillRef>
+      <a:effectRef idx="0">
+        <a:scrgbClr r="0" g="0" b="0"/>
+      </a:effectRef>
+      <a:fontRef idx="minor"/>
+    </dgm:style>
+  </dgm:styleLbl>
+  <dgm:styleLbl name="trAlignAcc1">
+    <dgm:scene3d>
+      <a:camera prst="orthographicFront"/>
+      <a:lightRig rig="threePt" dir="t"/>
+    </dgm:scene3d>
+    <dgm:sp3d/>
+    <dgm:txPr/>
+    <dgm:style>
+      <a:lnRef idx="1">
+        <a:scrgbClr r="0" g="0" b="0"/>
+      </a:lnRef>
+      <a:fillRef idx="1">
+        <a:scrgbClr r="0" g="0" b="0"/>
+      </a:fillRef>
+      <a:effectRef idx="0">
+        <a:scrgbClr r="0" g="0" b="0"/>
+      </a:effectRef>
+      <a:fontRef idx="minor"/>
+    </dgm:style>
+  </dgm:styleLbl>
+  <dgm:styleLbl name="bgAcc1">
+    <dgm:scene3d>
+      <a:camera prst="orthographicFront"/>
+      <a:lightRig rig="threePt" dir="t"/>
+    </dgm:scene3d>
+    <dgm:sp3d/>
+    <dgm:txPr/>
+    <dgm:style>
+      <a:lnRef idx="2">
+        <a:scrgbClr r="0" g="0" b="0"/>
+      </a:lnRef>
+      <a:fillRef idx="1">
+        <a:scrgbClr r="0" g="0" b="0"/>
+      </a:fillRef>
+      <a:effectRef idx="0">
+        <a:scrgbClr r="0" g="0" b="0"/>
+      </a:effectRef>
+      <a:fontRef idx="minor"/>
+    </dgm:style>
+  </dgm:styleLbl>
+  <dgm:styleLbl name="solidFgAcc1">
+    <dgm:scene3d>
+      <a:camera prst="orthographicFront"/>
+      <a:lightRig rig="threePt" dir="t"/>
+    </dgm:scene3d>
+    <dgm:sp3d/>
+    <dgm:txPr/>
+    <dgm:style>
+      <a:lnRef idx="2">
+        <a:scrgbClr r="0" g="0" b="0"/>
+      </a:lnRef>
+      <a:fillRef idx="1">
+        <a:scrgbClr r="0" g="0" b="0"/>
+      </a:fillRef>
+      <a:effectRef idx="0">
+        <a:scrgbClr r="0" g="0" b="0"/>
+      </a:effectRef>
+      <a:fontRef idx="minor"/>
+    </dgm:style>
+  </dgm:styleLbl>
+  <dgm:styleLbl name="solidAlignAcc1">
+    <dgm:scene3d>
+      <a:camera prst="orthographicFront"/>
+      <a:lightRig rig="threePt" dir="t"/>
+    </dgm:scene3d>
+    <dgm:sp3d/>
+    <dgm:txPr/>
+    <dgm:style>
+      <a:lnRef idx="2">
+        <a:scrgbClr r="0" g="0" b="0"/>
+      </a:lnRef>
+      <a:fillRef idx="1">
+        <a:scrgbClr r="0" g="0" b="0"/>
+      </a:fillRef>
+      <a:effectRef idx="0">
+        <a:scrgbClr r="0" g="0" b="0"/>
+      </a:effectRef>
+      <a:fontRef idx="minor"/>
+    </dgm:style>
+  </dgm:styleLbl>
+  <dgm:styleLbl name="solidBgAcc1">
+    <dgm:scene3d>
+      <a:camera prst="orthographicFront"/>
+      <a:lightRig rig="threePt" dir="t"/>
+    </dgm:scene3d>
+    <dgm:sp3d/>
+    <dgm:txPr/>
+    <dgm:style>
+      <a:lnRef idx="2">
+        <a:scrgbClr r="0" g="0" b="0"/>
+      </a:lnRef>
+      <a:fillRef idx="1">
+        <a:scrgbClr r="0" g="0" b="0"/>
+      </a:fillRef>
+      <a:effectRef idx="0">
+        <a:scrgbClr r="0" g="0" b="0"/>
+      </a:effectRef>
+      <a:fontRef idx="minor"/>
+    </dgm:style>
+  </dgm:styleLbl>
+  <dgm:styleLbl name="fgAccFollowNode1">
+    <dgm:scene3d>
+      <a:camera prst="orthographicFront"/>
+      <a:lightRig rig="threePt" dir="t"/>
+    </dgm:scene3d>
+    <dgm:sp3d/>
+    <dgm:txPr/>
+    <dgm:style>
+      <a:lnRef idx="2">
+        <a:scrgbClr r="0" g="0" b="0"/>
+      </a:lnRef>
+      <a:fillRef idx="1">
+        <a:scrgbClr r="0" g="0" b="0"/>
+      </a:fillRef>
+      <a:effectRef idx="0">
+        <a:scrgbClr r="0" g="0" b="0"/>
+      </a:effectRef>
+      <a:fontRef idx="minor"/>
+    </dgm:style>
+  </dgm:styleLbl>
+  <dgm:styleLbl name="alignAccFollowNode1">
+    <dgm:scene3d>
+      <a:camera prst="orthographicFront"/>
+      <a:lightRig rig="threePt" dir="t"/>
+    </dgm:scene3d>
+    <dgm:sp3d/>
+    <dgm:txPr/>
+    <dgm:style>
+      <a:lnRef idx="2">
+        <a:scrgbClr r="0" g="0" b="0"/>
+      </a:lnRef>
+      <a:fillRef idx="1">
+        <a:scrgbClr r="0" g="0" b="0"/>
+      </a:fillRef>
+      <a:effectRef idx="0">
+        <a:scrgbClr r="0" g="0" b="0"/>
+      </a:effectRef>
+      <a:fontRef idx="minor"/>
+    </dgm:style>
+  </dgm:styleLbl>
+  <dgm:styleLbl name="bgAccFollowNode1">
+    <dgm:scene3d>
+      <a:camera prst="orthographicFront"/>
+      <a:lightRig rig="threePt" dir="t"/>
+    </dgm:scene3d>
+    <dgm:sp3d/>
+    <dgm:txPr/>
+    <dgm:style>
+      <a:lnRef idx="2">
+        <a:scrgbClr r="0" g="0" b="0"/>
+      </a:lnRef>
+      <a:fillRef idx="1">
+        <a:scrgbClr r="0" g="0" b="0"/>
+      </a:fillRef>
+      <a:effectRef idx="0">
+        <a:scrgbClr r="0" g="0" b="0"/>
+      </a:effectRef>
+      <a:fontRef idx="minor"/>
+    </dgm:style>
+  </dgm:styleLbl>
+  <dgm:styleLbl name="fgAcc0">
+    <dgm:scene3d>
+      <a:camera prst="orthographicFront"/>
+      <a:lightRig rig="threePt" dir="t"/>
+    </dgm:scene3d>
+    <dgm:sp3d/>
+    <dgm:txPr/>
+    <dgm:style>
+      <a:lnRef idx="2">
+        <a:scrgbClr r="0" g="0" b="0"/>
+      </a:lnRef>
+      <a:fillRef idx="1">
+        <a:scrgbClr r="0" g="0" b="0"/>
+      </a:fillRef>
+      <a:effectRef idx="0">
+        <a:scrgbClr r="0" g="0" b="0"/>
+      </a:effectRef>
+      <a:fontRef idx="minor"/>
+    </dgm:style>
+  </dgm:styleLbl>
+  <dgm:styleLbl name="fgAcc2">
+    <dgm:scene3d>
+      <a:camera prst="orthographicFront"/>
+      <a:lightRig rig="threePt" dir="t"/>
+    </dgm:scene3d>
+    <dgm:sp3d/>
+    <dgm:txPr/>
+    <dgm:style>
+      <a:lnRef idx="2">
+        <a:scrgbClr r="0" g="0" b="0"/>
+      </a:lnRef>
+      <a:fillRef idx="1">
+        <a:scrgbClr r="0" g="0" b="0"/>
+      </a:fillRef>
+      <a:effectRef idx="0">
+        <a:scrgbClr r="0" g="0" b="0"/>
+      </a:effectRef>
+      <a:fontRef idx="minor"/>
+    </dgm:style>
+  </dgm:styleLbl>
+  <dgm:styleLbl name="fgAcc3">
+    <dgm:scene3d>
+      <a:camera prst="orthographicFront"/>
+      <a:lightRig rig="threePt" dir="t"/>
+    </dgm:scene3d>
+    <dgm:sp3d/>
+    <dgm:txPr/>
+    <dgm:style>
+      <a:lnRef idx="2">
+        <a:scrgbClr r="0" g="0" b="0"/>
+      </a:lnRef>
+      <a:fillRef idx="1">
+        <a:scrgbClr r="0" g="0" b="0"/>
+      </a:fillRef>
+      <a:effectRef idx="0">
+        <a:scrgbClr r="0" g="0" b="0"/>
+      </a:effectRef>
+      <a:fontRef idx="minor"/>
+    </dgm:style>
+  </dgm:styleLbl>
+  <dgm:styleLbl name="fgAcc4">
+    <dgm:scene3d>
+      <a:camera prst="orthographicFront"/>
+      <a:lightRig rig="threePt" dir="t"/>
+    </dgm:scene3d>
+    <dgm:sp3d/>
+    <dgm:txPr/>
+    <dgm:style>
+      <a:lnRef idx="2">
+        <a:scrgbClr r="0" g="0" b="0"/>
+      </a:lnRef>
+      <a:fillRef idx="1">
+        <a:scrgbClr r="0" g="0" b="0"/>
+      </a:fillRef>
+      <a:effectRef idx="0">
+        <a:scrgbClr r="0" g="0" b="0"/>
+      </a:effectRef>
+      <a:fontRef idx="minor"/>
+    </dgm:style>
+  </dgm:styleLbl>
+  <dgm:styleLbl name="bgShp">
+    <dgm:scene3d>
+      <a:camera prst="orthographicFront"/>
+      <a:lightRig rig="threePt" dir="t"/>
+    </dgm:scene3d>
+    <dgm:sp3d/>
+    <dgm:txPr/>
+    <dgm:style>
+      <a:lnRef idx="0">
+        <a:scrgbClr r="0" g="0" b="0"/>
+      </a:lnRef>
+      <a:fillRef idx="1">
+        <a:scrgbClr r="0" g="0" b="0"/>
+      </a:fillRef>
+      <a:effectRef idx="0">
+        <a:scrgbClr r="0" g="0" b="0"/>
+      </a:effectRef>
+      <a:fontRef idx="minor"/>
+    </dgm:style>
+  </dgm:styleLbl>
+  <dgm:styleLbl name="dkBgShp">
+    <dgm:scene3d>
+      <a:camera prst="orthographicFront"/>
+      <a:lightRig rig="threePt" dir="t"/>
+    </dgm:scene3d>
+    <dgm:sp3d/>
+    <dgm:txPr/>
+    <dgm:style>
+      <a:lnRef idx="0">
+        <a:scrgbClr r="0" g="0" b="0"/>
+      </a:lnRef>
+      <a:fillRef idx="1">
+        <a:scrgbClr r="0" g="0" b="0"/>
+      </a:fillRef>
+      <a:effectRef idx="0">
+        <a:scrgbClr r="0" g="0" b="0"/>
+      </a:effectRef>
+      <a:fontRef idx="minor"/>
+    </dgm:style>
+  </dgm:styleLbl>
+  <dgm:styleLbl name="trBgShp">
+    <dgm:scene3d>
+      <a:camera prst="orthographicFront"/>
+      <a:lightRig rig="threePt" dir="t"/>
+    </dgm:scene3d>
+    <dgm:sp3d/>
+    <dgm:txPr/>
+    <dgm:style>
+      <a:lnRef idx="0">
+        <a:scrgbClr r="0" g="0" b="0"/>
+      </a:lnRef>
+      <a:fillRef idx="1">
+        <a:scrgbClr r="0" g="0" b="0"/>
+      </a:fillRef>
+      <a:effectRef idx="0">
+        <a:scrgbClr r="0" g="0" b="0"/>
+      </a:effectRef>
+      <a:fontRef idx="minor"/>
+    </dgm:style>
+  </dgm:styleLbl>
+  <dgm:styleLbl name="fgShp">
+    <dgm:scene3d>
+      <a:camera prst="orthographicFront"/>
+      <a:lightRig rig="threePt" dir="t"/>
+    </dgm:scene3d>
+    <dgm:sp3d/>
+    <dgm:txPr/>
+    <dgm:style>
+      <a:lnRef idx="2">
+        <a:scrgbClr r="0" g="0" b="0"/>
+      </a:lnRef>
+      <a:fillRef idx="1">
+        <a:scrgbClr r="0" g="0" b="0"/>
+      </a:fillRef>
+      <a:effectRef idx="0">
+        <a:scrgbClr r="0" g="0" b="0"/>
+      </a:effectRef>
+      <a:fontRef idx="minor"/>
+    </dgm:style>
+  </dgm:styleLbl>
+  <dgm:styleLbl name="revTx">
+    <dgm:scene3d>
+      <a:camera prst="orthographicFront"/>
+      <a:lightRig rig="threePt" dir="t"/>
+    </dgm:scene3d>
+    <dgm:sp3d/>
+    <dgm:txPr/>
+    <dgm:style>
+      <a:lnRef idx="0">
+        <a:scrgbClr r="0" g="0" b="0"/>
+      </a:lnRef>
+      <a:fillRef idx="0">
+        <a:scrgbClr r="0" g="0" b="0"/>
+      </a:fillRef>
+      <a:effectRef idx="0">
+        <a:scrgbClr r="0" g="0" b="0"/>
+      </a:effectRef>
+      <a:fontRef idx="minor"/>
+    </dgm:style>
+  </dgm:styleLbl>
+</dgm:styleDef>
+</file>
+
 <file path=ppt/slideLayouts/slideLayout1.xml><?xml version="1.0" encoding="utf-8"?>
 <p:sldLayout xmlns:a="http://schemas.openxmlformats.org/drawingml/2006/main" xmlns:r="http://schemas.openxmlformats.org/officeDocument/2006/relationships" xmlns:p="http://schemas.openxmlformats.org/presentationml/2006/main" type="title" preserve="1">
   <p:cSld name="Title Slide">
@@ -269,7 +3008,7 @@
           <a:p>
             <a:fld id="{F8923EA7-4D27-43A1-90DD-8C1ED5E1706F}" type="datetimeFigureOut">
               <a:rPr lang="en-GB" smtClean="0"/>
-              <a:t>27/01/2025</a:t>
+              <a:t>28/01/2025</a:t>
             </a:fld>
             <a:endParaRPr lang="en-GB"/>
           </a:p>
@@ -467,7 +3206,7 @@
           <a:p>
             <a:fld id="{F8923EA7-4D27-43A1-90DD-8C1ED5E1706F}" type="datetimeFigureOut">
               <a:rPr lang="en-GB" smtClean="0"/>
-              <a:t>27/01/2025</a:t>
+              <a:t>28/01/2025</a:t>
             </a:fld>
             <a:endParaRPr lang="en-GB"/>
           </a:p>
@@ -675,7 +3414,7 @@
           <a:p>
             <a:fld id="{F8923EA7-4D27-43A1-90DD-8C1ED5E1706F}" type="datetimeFigureOut">
               <a:rPr lang="en-GB" smtClean="0"/>
-              <a:t>27/01/2025</a:t>
+              <a:t>28/01/2025</a:t>
             </a:fld>
             <a:endParaRPr lang="en-GB"/>
           </a:p>
@@ -873,7 +3612,7 @@
           <a:p>
             <a:fld id="{F8923EA7-4D27-43A1-90DD-8C1ED5E1706F}" type="datetimeFigureOut">
               <a:rPr lang="en-GB" smtClean="0"/>
-              <a:t>27/01/2025</a:t>
+              <a:t>28/01/2025</a:t>
             </a:fld>
             <a:endParaRPr lang="en-GB"/>
           </a:p>
@@ -1148,7 +3887,7 @@
           <a:p>
             <a:fld id="{F8923EA7-4D27-43A1-90DD-8C1ED5E1706F}" type="datetimeFigureOut">
               <a:rPr lang="en-GB" smtClean="0"/>
-              <a:t>27/01/2025</a:t>
+              <a:t>28/01/2025</a:t>
             </a:fld>
             <a:endParaRPr lang="en-GB"/>
           </a:p>
@@ -1413,7 +4152,7 @@
           <a:p>
             <a:fld id="{F8923EA7-4D27-43A1-90DD-8C1ED5E1706F}" type="datetimeFigureOut">
               <a:rPr lang="en-GB" smtClean="0"/>
-              <a:t>27/01/2025</a:t>
+              <a:t>28/01/2025</a:t>
             </a:fld>
             <a:endParaRPr lang="en-GB"/>
           </a:p>
@@ -1825,7 +4564,7 @@
           <a:p>
             <a:fld id="{F8923EA7-4D27-43A1-90DD-8C1ED5E1706F}" type="datetimeFigureOut">
               <a:rPr lang="en-GB" smtClean="0"/>
-              <a:t>27/01/2025</a:t>
+              <a:t>28/01/2025</a:t>
             </a:fld>
             <a:endParaRPr lang="en-GB"/>
           </a:p>
@@ -1966,7 +4705,7 @@
           <a:p>
             <a:fld id="{F8923EA7-4D27-43A1-90DD-8C1ED5E1706F}" type="datetimeFigureOut">
               <a:rPr lang="en-GB" smtClean="0"/>
-              <a:t>27/01/2025</a:t>
+              <a:t>28/01/2025</a:t>
             </a:fld>
             <a:endParaRPr lang="en-GB"/>
           </a:p>
@@ -2079,7 +4818,7 @@
           <a:p>
             <a:fld id="{F8923EA7-4D27-43A1-90DD-8C1ED5E1706F}" type="datetimeFigureOut">
               <a:rPr lang="en-GB" smtClean="0"/>
-              <a:t>27/01/2025</a:t>
+              <a:t>28/01/2025</a:t>
             </a:fld>
             <a:endParaRPr lang="en-GB"/>
           </a:p>
@@ -2390,7 +5129,7 @@
           <a:p>
             <a:fld id="{F8923EA7-4D27-43A1-90DD-8C1ED5E1706F}" type="datetimeFigureOut">
               <a:rPr lang="en-GB" smtClean="0"/>
-              <a:t>27/01/2025</a:t>
+              <a:t>28/01/2025</a:t>
             </a:fld>
             <a:endParaRPr lang="en-GB"/>
           </a:p>
@@ -2678,7 +5417,7 @@
           <a:p>
             <a:fld id="{F8923EA7-4D27-43A1-90DD-8C1ED5E1706F}" type="datetimeFigureOut">
               <a:rPr lang="en-GB" smtClean="0"/>
-              <a:t>27/01/2025</a:t>
+              <a:t>28/01/2025</a:t>
             </a:fld>
             <a:endParaRPr lang="en-GB"/>
           </a:p>
@@ -2919,7 +5658,7 @@
           <a:p>
             <a:fld id="{F8923EA7-4D27-43A1-90DD-8C1ED5E1706F}" type="datetimeFigureOut">
               <a:rPr lang="en-GB" smtClean="0"/>
-              <a:t>27/01/2025</a:t>
+              <a:t>28/01/2025</a:t>
             </a:fld>
             <a:endParaRPr lang="en-GB"/>
           </a:p>
@@ -3399,7 +6138,7 @@
           <p:cNvPr id="2" name="Title 1">
             <a:extLst>
               <a:ext uri="{FF2B5EF4-FFF2-40B4-BE49-F238E27FC236}">
-                <a16:creationId xmlns:a16="http://schemas.microsoft.com/office/drawing/2014/main" id="{4A4A9EA4-9835-19A8-A424-BD10D4C318F0}"/>
+                <a16:creationId xmlns:a16="http://schemas.microsoft.com/office/drawing/2014/main" id="{7129EEA7-BA0E-A703-53A3-5FF4BC142EBA}"/>
               </a:ext>
             </a:extLst>
           </p:cNvPr>
@@ -3417,17 +6156,47 @@
           <a:p>
             <a:r>
               <a:rPr lang="en-GB" dirty="0"/>
-              <a:t>Algorithm designs - pseudocode</a:t>
+              <a:t>Algorithm designs - flowcharts</a:t>
             </a:r>
           </a:p>
         </p:txBody>
       </p:sp>
+    </p:spTree>
+    <p:extLst>
+      <p:ext uri="{BB962C8B-B14F-4D97-AF65-F5344CB8AC3E}">
+        <p14:creationId xmlns:p14="http://schemas.microsoft.com/office/powerpoint/2010/main" val="3848852462"/>
+      </p:ext>
+    </p:extLst>
+  </p:cSld>
+  <p:clrMapOvr>
+    <a:masterClrMapping/>
+  </p:clrMapOvr>
+</p:sld>
+</file>
+
+<file path=ppt/slides/slide11.xml><?xml version="1.0" encoding="utf-8"?>
+<p:sld xmlns:a="http://schemas.openxmlformats.org/drawingml/2006/main" xmlns:r="http://schemas.openxmlformats.org/officeDocument/2006/relationships" xmlns:p="http://schemas.openxmlformats.org/presentationml/2006/main">
+  <p:cSld>
+    <p:spTree>
+      <p:nvGrpSpPr>
+        <p:cNvPr id="1" name=""/>
+        <p:cNvGrpSpPr/>
+        <p:nvPr/>
+      </p:nvGrpSpPr>
+      <p:grpSpPr>
+        <a:xfrm>
+          <a:off x="0" y="0"/>
+          <a:ext cx="0" cy="0"/>
+          <a:chOff x="0" y="0"/>
+          <a:chExt cx="0" cy="0"/>
+        </a:xfrm>
+      </p:grpSpPr>
       <p:sp>
         <p:nvSpPr>
-          <p:cNvPr id="3" name="Content Placeholder 2">
-            <a:extLst>
-              <a:ext uri="{FF2B5EF4-FFF2-40B4-BE49-F238E27FC236}">
-                <a16:creationId xmlns:a16="http://schemas.microsoft.com/office/drawing/2014/main" id="{8A0A9EB2-6D31-0B0A-DE03-D235F2F26F39}"/>
+          <p:cNvPr id="2" name="Title 1">
+            <a:extLst>
+              <a:ext uri="{FF2B5EF4-FFF2-40B4-BE49-F238E27FC236}">
+                <a16:creationId xmlns:a16="http://schemas.microsoft.com/office/drawing/2014/main" id="{4A4A9EA4-9835-19A8-A424-BD10D4C318F0}"/>
               </a:ext>
             </a:extLst>
           </p:cNvPr>
@@ -3435,7 +6204,7 @@
             <a:spLocks noGrp="1"/>
           </p:cNvSpPr>
           <p:nvPr>
-            <p:ph idx="1"/>
+            <p:ph type="title"/>
           </p:nvPr>
         </p:nvSpPr>
         <p:spPr/>
@@ -3443,7 +6212,10 @@
           <a:bodyPr/>
           <a:lstStyle/>
           <a:p>
-            <a:endParaRPr lang="en-GB"/>
+            <a:r>
+              <a:rPr lang="en-GB" dirty="0"/>
+              <a:t>Algorithm designs - pseudocode</a:t>
+            </a:r>
           </a:p>
         </p:txBody>
       </p:sp>
@@ -3460,7 +6232,7 @@
 </p:sld>
 </file>
 
-<file path=ppt/slides/slide11.xml><?xml version="1.0" encoding="utf-8"?>
+<file path=ppt/slides/slide12.xml><?xml version="1.0" encoding="utf-8"?>
 <p:sld xmlns:a="http://schemas.openxmlformats.org/drawingml/2006/main" xmlns:r="http://schemas.openxmlformats.org/officeDocument/2006/relationships" xmlns:p="http://schemas.openxmlformats.org/presentationml/2006/main">
   <p:cSld>
     <p:spTree>
@@ -4634,6 +7406,45 @@
           </a:p>
         </p:txBody>
       </p:sp>
+      <p:cxnSp>
+        <p:nvCxnSpPr>
+          <p:cNvPr id="10" name="Straight Connector 9">
+            <a:extLst>
+              <a:ext uri="{FF2B5EF4-FFF2-40B4-BE49-F238E27FC236}">
+                <a16:creationId xmlns:a16="http://schemas.microsoft.com/office/drawing/2014/main" id="{8296D4E8-10A6-A735-F41D-624E3BD6CF9F}"/>
+              </a:ext>
+            </a:extLst>
+          </p:cNvPr>
+          <p:cNvCxnSpPr>
+            <a:stCxn id="4" idx="2"/>
+            <a:endCxn id="5" idx="0"/>
+          </p:cNvCxnSpPr>
+          <p:nvPr/>
+        </p:nvCxnSpPr>
+        <p:spPr>
+          <a:xfrm flipH="1">
+            <a:off x="5672327" y="1709769"/>
+            <a:ext cx="1" cy="232379"/>
+          </a:xfrm>
+          <a:prstGeom prst="line">
+            <a:avLst/>
+          </a:prstGeom>
+        </p:spPr>
+        <p:style>
+          <a:lnRef idx="2">
+            <a:schemeClr val="accent1"/>
+          </a:lnRef>
+          <a:fillRef idx="0">
+            <a:schemeClr val="accent1"/>
+          </a:fillRef>
+          <a:effectRef idx="1">
+            <a:schemeClr val="accent1"/>
+          </a:effectRef>
+          <a:fontRef idx="minor">
+            <a:schemeClr val="tx1"/>
+          </a:fontRef>
+        </p:style>
+      </p:cxnSp>
     </p:spTree>
     <p:extLst>
       <p:ext uri="{BB962C8B-B14F-4D97-AF65-F5344CB8AC3E}">
@@ -4680,7 +7491,12 @@
             <p:ph type="title"/>
           </p:nvPr>
         </p:nvSpPr>
-        <p:spPr/>
+        <p:spPr>
+          <a:xfrm>
+            <a:off x="2799748" y="211756"/>
+            <a:ext cx="6592503" cy="718536"/>
+          </a:xfrm>
+        </p:spPr>
         <p:txBody>
           <a:bodyPr/>
           <a:lstStyle/>
@@ -4689,31 +7505,6 @@
               <a:rPr lang="en-GB" dirty="0"/>
               <a:t>ER Diagram for the database</a:t>
             </a:r>
-          </a:p>
-        </p:txBody>
-      </p:sp>
-      <p:sp>
-        <p:nvSpPr>
-          <p:cNvPr id="3" name="Content Placeholder 2">
-            <a:extLst>
-              <a:ext uri="{FF2B5EF4-FFF2-40B4-BE49-F238E27FC236}">
-                <a16:creationId xmlns:a16="http://schemas.microsoft.com/office/drawing/2014/main" id="{B54DB18F-ADB4-D80A-A220-C231FD84C9D6}"/>
-              </a:ext>
-            </a:extLst>
-          </p:cNvPr>
-          <p:cNvSpPr>
-            <a:spLocks noGrp="1"/>
-          </p:cNvSpPr>
-          <p:nvPr>
-            <p:ph idx="1"/>
-          </p:nvPr>
-        </p:nvSpPr>
-        <p:spPr/>
-        <p:txBody>
-          <a:bodyPr/>
-          <a:lstStyle/>
-          <a:p>
-            <a:endParaRPr lang="en-GB"/>
           </a:p>
         </p:txBody>
       </p:sp>
@@ -4763,40 +7554,22 @@
             <p:ph type="title"/>
           </p:nvPr>
         </p:nvSpPr>
-        <p:spPr/>
+        <p:spPr>
+          <a:xfrm>
+            <a:off x="3921091" y="240630"/>
+            <a:ext cx="4349817" cy="728163"/>
+          </a:xfrm>
+        </p:spPr>
         <p:txBody>
-          <a:bodyPr/>
+          <a:bodyPr>
+            <a:normAutofit/>
+          </a:bodyPr>
           <a:lstStyle/>
           <a:p>
             <a:r>
               <a:rPr lang="en-GB" dirty="0"/>
               <a:t>Data flow diagram</a:t>
             </a:r>
-          </a:p>
-        </p:txBody>
-      </p:sp>
-      <p:sp>
-        <p:nvSpPr>
-          <p:cNvPr id="3" name="Content Placeholder 2">
-            <a:extLst>
-              <a:ext uri="{FF2B5EF4-FFF2-40B4-BE49-F238E27FC236}">
-                <a16:creationId xmlns:a16="http://schemas.microsoft.com/office/drawing/2014/main" id="{346CB5B6-687F-E48D-08C7-75DE5F56B5DF}"/>
-              </a:ext>
-            </a:extLst>
-          </p:cNvPr>
-          <p:cNvSpPr>
-            <a:spLocks noGrp="1"/>
-          </p:cNvSpPr>
-          <p:nvPr>
-            <p:ph idx="1"/>
-          </p:nvPr>
-        </p:nvSpPr>
-        <p:spPr/>
-        <p:txBody>
-          <a:bodyPr/>
-          <a:lstStyle/>
-          <a:p>
-            <a:endParaRPr lang="en-GB"/>
           </a:p>
         </p:txBody>
       </p:sp>
@@ -4846,7 +7619,12 @@
             <p:ph type="title"/>
           </p:nvPr>
         </p:nvSpPr>
-        <p:spPr/>
+        <p:spPr>
+          <a:xfrm>
+            <a:off x="2385862" y="394635"/>
+            <a:ext cx="7420276" cy="882166"/>
+          </a:xfrm>
+        </p:spPr>
         <p:txBody>
           <a:bodyPr/>
           <a:lstStyle/>
@@ -5264,15 +8042,171 @@
             <p:ph idx="1"/>
           </p:nvPr>
         </p:nvSpPr>
-        <p:spPr/>
+        <p:spPr>
+          <a:xfrm>
+            <a:off x="838199" y="1560700"/>
+            <a:ext cx="10515600" cy="922035"/>
+          </a:xfrm>
+        </p:spPr>
         <p:txBody>
           <a:bodyPr/>
           <a:lstStyle/>
           <a:p>
-            <a:endParaRPr lang="en-GB"/>
+            <a:r>
+              <a:rPr lang="en-GB" dirty="0"/>
+              <a:t>For the colour scheme I will be using a colour scheme based around the government health website colour designs</a:t>
+            </a:r>
           </a:p>
         </p:txBody>
       </p:sp>
+      <p:pic>
+        <p:nvPicPr>
+          <p:cNvPr id="5" name="Picture 4">
+            <a:extLst>
+              <a:ext uri="{FF2B5EF4-FFF2-40B4-BE49-F238E27FC236}">
+                <a16:creationId xmlns:a16="http://schemas.microsoft.com/office/drawing/2014/main" id="{1774D956-5D9F-AA40-F914-1A722A8D2521}"/>
+              </a:ext>
+            </a:extLst>
+          </p:cNvPr>
+          <p:cNvPicPr>
+            <a:picLocks noChangeAspect="1"/>
+          </p:cNvPicPr>
+          <p:nvPr/>
+        </p:nvPicPr>
+        <p:blipFill>
+          <a:blip r:embed="rId2"/>
+          <a:stretch>
+            <a:fillRect/>
+          </a:stretch>
+        </p:blipFill>
+        <p:spPr>
+          <a:xfrm>
+            <a:off x="394695" y="2755423"/>
+            <a:ext cx="2257740" cy="1629002"/>
+          </a:xfrm>
+          <a:prstGeom prst="rect">
+            <a:avLst/>
+          </a:prstGeom>
+        </p:spPr>
+      </p:pic>
+      <p:pic>
+        <p:nvPicPr>
+          <p:cNvPr id="7" name="Picture 6">
+            <a:extLst>
+              <a:ext uri="{FF2B5EF4-FFF2-40B4-BE49-F238E27FC236}">
+                <a16:creationId xmlns:a16="http://schemas.microsoft.com/office/drawing/2014/main" id="{8E67FDDA-F8FB-17BD-1C42-9251A1372590}"/>
+              </a:ext>
+            </a:extLst>
+          </p:cNvPr>
+          <p:cNvPicPr>
+            <a:picLocks noChangeAspect="1"/>
+          </p:cNvPicPr>
+          <p:nvPr/>
+        </p:nvPicPr>
+        <p:blipFill>
+          <a:blip r:embed="rId3"/>
+          <a:stretch>
+            <a:fillRect/>
+          </a:stretch>
+        </p:blipFill>
+        <p:spPr>
+          <a:xfrm>
+            <a:off x="3434759" y="2733371"/>
+            <a:ext cx="2267266" cy="1790950"/>
+          </a:xfrm>
+          <a:prstGeom prst="rect">
+            <a:avLst/>
+          </a:prstGeom>
+        </p:spPr>
+      </p:pic>
+      <p:pic>
+        <p:nvPicPr>
+          <p:cNvPr id="9" name="Picture 8">
+            <a:extLst>
+              <a:ext uri="{FF2B5EF4-FFF2-40B4-BE49-F238E27FC236}">
+                <a16:creationId xmlns:a16="http://schemas.microsoft.com/office/drawing/2014/main" id="{A662A519-78D1-3A94-2661-0C0E48E0DD25}"/>
+              </a:ext>
+            </a:extLst>
+          </p:cNvPr>
+          <p:cNvPicPr>
+            <a:picLocks noChangeAspect="1"/>
+          </p:cNvPicPr>
+          <p:nvPr/>
+        </p:nvPicPr>
+        <p:blipFill>
+          <a:blip r:embed="rId4"/>
+          <a:stretch>
+            <a:fillRect/>
+          </a:stretch>
+        </p:blipFill>
+        <p:spPr>
+          <a:xfrm>
+            <a:off x="9596722" y="2695265"/>
+            <a:ext cx="2200582" cy="1667108"/>
+          </a:xfrm>
+          <a:prstGeom prst="rect">
+            <a:avLst/>
+          </a:prstGeom>
+        </p:spPr>
+      </p:pic>
+      <p:pic>
+        <p:nvPicPr>
+          <p:cNvPr id="11" name="Picture 10">
+            <a:extLst>
+              <a:ext uri="{FF2B5EF4-FFF2-40B4-BE49-F238E27FC236}">
+                <a16:creationId xmlns:a16="http://schemas.microsoft.com/office/drawing/2014/main" id="{7494DFEB-ED97-F460-EFD1-3030ACB6819F}"/>
+              </a:ext>
+            </a:extLst>
+          </p:cNvPr>
+          <p:cNvPicPr>
+            <a:picLocks noChangeAspect="1"/>
+          </p:cNvPicPr>
+          <p:nvPr/>
+        </p:nvPicPr>
+        <p:blipFill>
+          <a:blip r:embed="rId5"/>
+          <a:stretch>
+            <a:fillRect/>
+          </a:stretch>
+        </p:blipFill>
+        <p:spPr>
+          <a:xfrm>
+            <a:off x="6484349" y="2733371"/>
+            <a:ext cx="2210108" cy="1700450"/>
+          </a:xfrm>
+          <a:prstGeom prst="rect">
+            <a:avLst/>
+          </a:prstGeom>
+        </p:spPr>
+      </p:pic>
+      <p:graphicFrame>
+        <p:nvGraphicFramePr>
+          <p:cNvPr id="14" name="TextBox 11">
+            <a:extLst>
+              <a:ext uri="{FF2B5EF4-FFF2-40B4-BE49-F238E27FC236}">
+                <a16:creationId xmlns:a16="http://schemas.microsoft.com/office/drawing/2014/main" id="{F4BF9E31-2CE4-FD45-2745-FC4AC4474AF8}"/>
+              </a:ext>
+            </a:extLst>
+          </p:cNvPr>
+          <p:cNvGraphicFramePr/>
+          <p:nvPr>
+            <p:extLst>
+              <p:ext uri="{D42A27DB-BD31-4B8C-83A1-F6EECF244321}">
+                <p14:modId xmlns:p14="http://schemas.microsoft.com/office/powerpoint/2010/main" val="2123744983"/>
+              </p:ext>
+            </p:extLst>
+          </p:nvPr>
+        </p:nvGraphicFramePr>
+        <p:xfrm>
+          <a:off x="394695" y="4693403"/>
+          <a:ext cx="11402609" cy="1477328"/>
+        </p:xfrm>
+        <a:graphic>
+          <a:graphicData uri="http://schemas.openxmlformats.org/drawingml/2006/diagram">
+            <dgm:relIds xmlns:dgm="http://schemas.openxmlformats.org/drawingml/2006/diagram" xmlns:r="http://schemas.openxmlformats.org/officeDocument/2006/relationships" r:dm="rId6" r:lo="rId7" r:qs="rId8" r:cs="rId9"/>
+          </a:graphicData>
+        </a:graphic>
+      </p:graphicFrame>
     </p:spTree>
     <p:extLst>
       <p:ext uri="{BB962C8B-B14F-4D97-AF65-F5344CB8AC3E}">
@@ -5308,7 +8242,7 @@
           <p:cNvPr id="2" name="Title 1">
             <a:extLst>
               <a:ext uri="{FF2B5EF4-FFF2-40B4-BE49-F238E27FC236}">
-                <a16:creationId xmlns:a16="http://schemas.microsoft.com/office/drawing/2014/main" id="{BF7E9948-16B2-8217-C526-C4A1611E9761}"/>
+                <a16:creationId xmlns:a16="http://schemas.microsoft.com/office/drawing/2014/main" id="{DB6C5674-4415-57C9-CD04-57713B51CBAF}"/>
               </a:ext>
             </a:extLst>
           </p:cNvPr>
@@ -5319,47 +8253,184 @@
             <p:ph type="title"/>
           </p:nvPr>
         </p:nvSpPr>
-        <p:spPr/>
+        <p:spPr>
+          <a:xfrm>
+            <a:off x="3035567" y="299538"/>
+            <a:ext cx="6120865" cy="651160"/>
+          </a:xfrm>
+        </p:spPr>
         <p:txBody>
-          <a:bodyPr/>
+          <a:bodyPr>
+            <a:normAutofit fontScale="90000"/>
+          </a:bodyPr>
           <a:lstStyle/>
           <a:p>
             <a:r>
               <a:rPr lang="en-GB" dirty="0"/>
-              <a:t>Interface designs</a:t>
+              <a:t>Colour scheme in context </a:t>
             </a:r>
           </a:p>
         </p:txBody>
       </p:sp>
+      <p:pic>
+        <p:nvPicPr>
+          <p:cNvPr id="5" name="Picture 4">
+            <a:extLst>
+              <a:ext uri="{FF2B5EF4-FFF2-40B4-BE49-F238E27FC236}">
+                <a16:creationId xmlns:a16="http://schemas.microsoft.com/office/drawing/2014/main" id="{B4F8867C-60DD-BC84-B671-CDA1432CC4AE}"/>
+              </a:ext>
+            </a:extLst>
+          </p:cNvPr>
+          <p:cNvPicPr>
+            <a:picLocks noChangeAspect="1"/>
+          </p:cNvPicPr>
+          <p:nvPr/>
+        </p:nvPicPr>
+        <p:blipFill>
+          <a:blip r:embed="rId2"/>
+          <a:stretch>
+            <a:fillRect/>
+          </a:stretch>
+        </p:blipFill>
+        <p:spPr>
+          <a:xfrm>
+            <a:off x="0" y="1332359"/>
+            <a:ext cx="10879068" cy="1247949"/>
+          </a:xfrm>
+          <a:prstGeom prst="rect">
+            <a:avLst/>
+          </a:prstGeom>
+        </p:spPr>
+      </p:pic>
+      <p:pic>
+        <p:nvPicPr>
+          <p:cNvPr id="7" name="Picture 6">
+            <a:extLst>
+              <a:ext uri="{FF2B5EF4-FFF2-40B4-BE49-F238E27FC236}">
+                <a16:creationId xmlns:a16="http://schemas.microsoft.com/office/drawing/2014/main" id="{248ECC95-205F-BC04-F4BF-857FA8ECD601}"/>
+              </a:ext>
+            </a:extLst>
+          </p:cNvPr>
+          <p:cNvPicPr>
+            <a:picLocks noChangeAspect="1"/>
+          </p:cNvPicPr>
+          <p:nvPr/>
+        </p:nvPicPr>
+        <p:blipFill>
+          <a:blip r:embed="rId3"/>
+          <a:stretch>
+            <a:fillRect/>
+          </a:stretch>
+        </p:blipFill>
+        <p:spPr>
+          <a:xfrm>
+            <a:off x="0" y="2886123"/>
+            <a:ext cx="2800741" cy="819264"/>
+          </a:xfrm>
+          <a:prstGeom prst="rect">
+            <a:avLst/>
+          </a:prstGeom>
+        </p:spPr>
+      </p:pic>
+      <p:pic>
+        <p:nvPicPr>
+          <p:cNvPr id="9" name="Picture 8">
+            <a:extLst>
+              <a:ext uri="{FF2B5EF4-FFF2-40B4-BE49-F238E27FC236}">
+                <a16:creationId xmlns:a16="http://schemas.microsoft.com/office/drawing/2014/main" id="{6AFB855A-1597-0752-B81A-ABA40C00645C}"/>
+              </a:ext>
+            </a:extLst>
+          </p:cNvPr>
+          <p:cNvPicPr>
+            <a:picLocks noChangeAspect="1"/>
+          </p:cNvPicPr>
+          <p:nvPr/>
+        </p:nvPicPr>
+        <p:blipFill>
+          <a:blip r:embed="rId4"/>
+          <a:stretch>
+            <a:fillRect/>
+          </a:stretch>
+        </p:blipFill>
+        <p:spPr>
+          <a:xfrm>
+            <a:off x="3060432" y="3019491"/>
+            <a:ext cx="1609950" cy="552527"/>
+          </a:xfrm>
+          <a:prstGeom prst="rect">
+            <a:avLst/>
+          </a:prstGeom>
+        </p:spPr>
+      </p:pic>
+      <p:pic>
+        <p:nvPicPr>
+          <p:cNvPr id="11" name="Picture 10">
+            <a:extLst>
+              <a:ext uri="{FF2B5EF4-FFF2-40B4-BE49-F238E27FC236}">
+                <a16:creationId xmlns:a16="http://schemas.microsoft.com/office/drawing/2014/main" id="{EE56D33A-22E6-46B1-8A84-6E0DD62D8977}"/>
+              </a:ext>
+            </a:extLst>
+          </p:cNvPr>
+          <p:cNvPicPr>
+            <a:picLocks noChangeAspect="1"/>
+          </p:cNvPicPr>
+          <p:nvPr/>
+        </p:nvPicPr>
+        <p:blipFill>
+          <a:blip r:embed="rId5"/>
+          <a:stretch>
+            <a:fillRect/>
+          </a:stretch>
+        </p:blipFill>
+        <p:spPr>
+          <a:xfrm>
+            <a:off x="5439534" y="2886123"/>
+            <a:ext cx="4934639" cy="2562583"/>
+          </a:xfrm>
+          <a:prstGeom prst="rect">
+            <a:avLst/>
+          </a:prstGeom>
+        </p:spPr>
+      </p:pic>
       <p:sp>
         <p:nvSpPr>
-          <p:cNvPr id="3" name="Content Placeholder 2">
-            <a:extLst>
-              <a:ext uri="{FF2B5EF4-FFF2-40B4-BE49-F238E27FC236}">
-                <a16:creationId xmlns:a16="http://schemas.microsoft.com/office/drawing/2014/main" id="{A90C43AF-2D3A-DB58-D4F4-908007A0E304}"/>
-              </a:ext>
-            </a:extLst>
-          </p:cNvPr>
-          <p:cNvSpPr>
-            <a:spLocks noGrp="1"/>
-          </p:cNvSpPr>
-          <p:nvPr>
-            <p:ph idx="1"/>
-          </p:nvPr>
+          <p:cNvPr id="12" name="TextBox 11">
+            <a:extLst>
+              <a:ext uri="{FF2B5EF4-FFF2-40B4-BE49-F238E27FC236}">
+                <a16:creationId xmlns:a16="http://schemas.microsoft.com/office/drawing/2014/main" id="{1A731F90-A492-A9B6-88E7-CB91C86DA6DB}"/>
+              </a:ext>
+            </a:extLst>
+          </p:cNvPr>
+          <p:cNvSpPr txBox="1"/>
+          <p:nvPr/>
         </p:nvSpPr>
-        <p:spPr/>
+        <p:spPr>
+          <a:xfrm>
+            <a:off x="356135" y="4071486"/>
+            <a:ext cx="4523873" cy="1754326"/>
+          </a:xfrm>
+          <a:prstGeom prst="rect">
+            <a:avLst/>
+          </a:prstGeom>
+          <a:noFill/>
+        </p:spPr>
         <p:txBody>
-          <a:bodyPr/>
+          <a:bodyPr wrap="square" rtlCol="0">
+            <a:spAutoFit/>
+          </a:bodyPr>
           <a:lstStyle/>
           <a:p>
-            <a:endParaRPr lang="en-GB"/>
+            <a:r>
+              <a:rPr lang="en-GB" dirty="0"/>
+              <a:t>Here is the use case to why I have chosen my colour scheme. I believe that if I follow these same guidelines to be able to follow WCAG so that the website is completely accessible to most if not all users to be able to navigate easily. </a:t>
+            </a:r>
           </a:p>
         </p:txBody>
       </p:sp>
     </p:spTree>
     <p:extLst>
       <p:ext uri="{BB962C8B-B14F-4D97-AF65-F5344CB8AC3E}">
-        <p14:creationId xmlns:p14="http://schemas.microsoft.com/office/powerpoint/2010/main" val="1227050922"/>
+        <p14:creationId xmlns:p14="http://schemas.microsoft.com/office/powerpoint/2010/main" val="3020797523"/>
       </p:ext>
     </p:extLst>
   </p:cSld>
@@ -5391,7 +8462,7 @@
           <p:cNvPr id="2" name="Title 1">
             <a:extLst>
               <a:ext uri="{FF2B5EF4-FFF2-40B4-BE49-F238E27FC236}">
-                <a16:creationId xmlns:a16="http://schemas.microsoft.com/office/drawing/2014/main" id="{7129EEA7-BA0E-A703-53A3-5FF4BC142EBA}"/>
+                <a16:creationId xmlns:a16="http://schemas.microsoft.com/office/drawing/2014/main" id="{BF7E9948-16B2-8217-C526-C4A1611E9761}"/>
               </a:ext>
             </a:extLst>
           </p:cNvPr>
@@ -5409,40 +8480,15 @@
           <a:p>
             <a:r>
               <a:rPr lang="en-GB" dirty="0"/>
-              <a:t>Algorithm designs - flowcharts</a:t>
-            </a:r>
-          </a:p>
-        </p:txBody>
-      </p:sp>
-      <p:sp>
-        <p:nvSpPr>
-          <p:cNvPr id="3" name="Content Placeholder 2">
-            <a:extLst>
-              <a:ext uri="{FF2B5EF4-FFF2-40B4-BE49-F238E27FC236}">
-                <a16:creationId xmlns:a16="http://schemas.microsoft.com/office/drawing/2014/main" id="{B56D343C-0F82-19F5-21C9-ED1DB61B3DEF}"/>
-              </a:ext>
-            </a:extLst>
-          </p:cNvPr>
-          <p:cNvSpPr>
-            <a:spLocks noGrp="1"/>
-          </p:cNvSpPr>
-          <p:nvPr>
-            <p:ph idx="1"/>
-          </p:nvPr>
-        </p:nvSpPr>
-        <p:spPr/>
-        <p:txBody>
-          <a:bodyPr/>
-          <a:lstStyle/>
-          <a:p>
-            <a:endParaRPr lang="en-GB" dirty="0"/>
+              <a:t>Interface designs</a:t>
+            </a:r>
           </a:p>
         </p:txBody>
       </p:sp>
     </p:spTree>
     <p:extLst>
       <p:ext uri="{BB962C8B-B14F-4D97-AF65-F5344CB8AC3E}">
-        <p14:creationId xmlns:p14="http://schemas.microsoft.com/office/powerpoint/2010/main" val="3848852462"/>
+        <p14:creationId xmlns:p14="http://schemas.microsoft.com/office/powerpoint/2010/main" val="1227050922"/>
       </p:ext>
     </p:extLst>
   </p:cSld>

</xml_diff>